<commit_message>
Add docker hub and dockerfile
</commit_message>
<xml_diff>
--- a/dockerfile_docker_hub.pptx
+++ b/dockerfile_docker_hub.pptx
@@ -5,12 +5,17 @@
     <p:sldMasterId id="2147483648" r:id="rId1"/>
   </p:sldMasterIdLst>
   <p:notesMasterIdLst>
-    <p:notesMasterId r:id="rId5"/>
+    <p:notesMasterId r:id="rId10"/>
   </p:notesMasterIdLst>
   <p:sldIdLst>
     <p:sldId id="256" r:id="rId2"/>
-    <p:sldId id="257" r:id="rId3"/>
-    <p:sldId id="258" r:id="rId4"/>
+    <p:sldId id="259" r:id="rId3"/>
+    <p:sldId id="260" r:id="rId4"/>
+    <p:sldId id="261" r:id="rId5"/>
+    <p:sldId id="257" r:id="rId6"/>
+    <p:sldId id="258" r:id="rId7"/>
+    <p:sldId id="262" r:id="rId8"/>
+    <p:sldId id="263" r:id="rId9"/>
   </p:sldIdLst>
   <p:sldSz cx="12192000" cy="6858000"/>
   <p:notesSz cx="6858000" cy="9144000"/>
@@ -109,6 +114,11 @@
       </a:defRPr>
     </a:lvl9pPr>
   </p:defaultTextStyle>
+  <p:extLst>
+    <p:ext uri="{EFAFB233-063F-42B5-8137-9DF3F51BA10A}">
+      <p15:sldGuideLst xmlns:p15="http://schemas.microsoft.com/office/powerpoint/2012/main"/>
+    </p:ext>
+  </p:extLst>
 </p:presentation>
 </file>
 
@@ -289,7 +299,6 @@
               <a:rPr lang="fr-FR"/>
               <a:t>Cinquième niveau</a:t>
             </a:r>
-            <a:endParaRPr lang="fr-FR"/>
           </a:p>
         </p:txBody>
       </p:sp>
@@ -507,7 +516,6 @@
               <a:rPr lang="fr-FR"/>
               <a:t>Modifiez le style du titre</a:t>
             </a:r>
-            <a:endParaRPr lang="fr-FR"/>
           </a:p>
         </p:txBody>
       </p:sp>
@@ -572,7 +580,6 @@
               <a:rPr lang="fr-FR"/>
               <a:t>Modifier le style des sous-titres du masque</a:t>
             </a:r>
-            <a:endParaRPr lang="fr-FR"/>
           </a:p>
         </p:txBody>
       </p:sp>
@@ -690,7 +697,6 @@
               <a:rPr lang="fr-FR"/>
               <a:t>Modifiez le style du titre</a:t>
             </a:r>
-            <a:endParaRPr lang="fr-FR"/>
           </a:p>
         </p:txBody>
       </p:sp>
@@ -742,7 +748,6 @@
               <a:rPr lang="fr-FR"/>
               <a:t>Cinquième niveau</a:t>
             </a:r>
-            <a:endParaRPr lang="fr-FR"/>
           </a:p>
         </p:txBody>
       </p:sp>
@@ -865,7 +870,6 @@
               <a:rPr lang="fr-FR"/>
               <a:t>Modifiez le style du titre</a:t>
             </a:r>
-            <a:endParaRPr lang="fr-FR"/>
           </a:p>
         </p:txBody>
       </p:sp>
@@ -922,7 +926,6 @@
               <a:rPr lang="fr-FR"/>
               <a:t>Cinquième niveau</a:t>
             </a:r>
-            <a:endParaRPr lang="fr-FR"/>
           </a:p>
         </p:txBody>
       </p:sp>
@@ -1040,7 +1043,6 @@
               <a:rPr lang="fr-FR"/>
               <a:t>Modifiez le style du titre</a:t>
             </a:r>
-            <a:endParaRPr lang="fr-FR"/>
           </a:p>
         </p:txBody>
       </p:sp>
@@ -1092,7 +1094,6 @@
               <a:rPr lang="fr-FR"/>
               <a:t>Cinquième niveau</a:t>
             </a:r>
-            <a:endParaRPr lang="fr-FR"/>
           </a:p>
         </p:txBody>
       </p:sp>
@@ -1219,7 +1220,6 @@
               <a:rPr lang="fr-FR"/>
               <a:t>Modifiez le style du titre</a:t>
             </a:r>
-            <a:endParaRPr lang="fr-FR"/>
           </a:p>
         </p:txBody>
       </p:sp>
@@ -1456,7 +1456,6 @@
               <a:rPr lang="fr-FR"/>
               <a:t>Modifiez le style du titre</a:t>
             </a:r>
-            <a:endParaRPr lang="fr-FR"/>
           </a:p>
         </p:txBody>
       </p:sp>
@@ -1513,7 +1512,6 @@
               <a:rPr lang="fr-FR"/>
               <a:t>Cinquième niveau</a:t>
             </a:r>
-            <a:endParaRPr lang="fr-FR"/>
           </a:p>
         </p:txBody>
       </p:sp>
@@ -1570,7 +1568,6 @@
               <a:rPr lang="fr-FR"/>
               <a:t>Cinquième niveau</a:t>
             </a:r>
-            <a:endParaRPr lang="fr-FR"/>
           </a:p>
         </p:txBody>
       </p:sp>
@@ -1693,7 +1690,6 @@
               <a:rPr lang="fr-FR"/>
               <a:t>Modifiez le style du titre</a:t>
             </a:r>
-            <a:endParaRPr lang="fr-FR"/>
           </a:p>
         </p:txBody>
       </p:sp>
@@ -1815,7 +1811,6 @@
               <a:rPr lang="fr-FR"/>
               <a:t>Cinquième niveau</a:t>
             </a:r>
-            <a:endParaRPr lang="fr-FR"/>
           </a:p>
         </p:txBody>
       </p:sp>
@@ -1937,7 +1932,6 @@
               <a:rPr lang="fr-FR"/>
               <a:t>Cinquième niveau</a:t>
             </a:r>
-            <a:endParaRPr lang="fr-FR"/>
           </a:p>
         </p:txBody>
       </p:sp>
@@ -2055,7 +2049,6 @@
               <a:rPr lang="fr-FR"/>
               <a:t>Modifiez le style du titre</a:t>
             </a:r>
-            <a:endParaRPr lang="fr-FR"/>
           </a:p>
         </p:txBody>
       </p:sp>
@@ -2277,7 +2270,6 @@
               <a:rPr lang="fr-FR"/>
               <a:t>Modifiez le style du titre</a:t>
             </a:r>
-            <a:endParaRPr lang="fr-FR"/>
           </a:p>
         </p:txBody>
       </p:sp>
@@ -2362,7 +2354,6 @@
               <a:rPr lang="fr-FR"/>
               <a:t>Cinquième niveau</a:t>
             </a:r>
-            <a:endParaRPr lang="fr-FR"/>
           </a:p>
         </p:txBody>
       </p:sp>
@@ -2554,7 +2545,6 @@
               <a:rPr lang="fr-FR"/>
               <a:t>Modifiez le style du titre</a:t>
             </a:r>
-            <a:endParaRPr lang="fr-FR"/>
           </a:p>
         </p:txBody>
       </p:sp>
@@ -2813,7 +2803,6 @@
               <a:rPr lang="fr-FR"/>
               <a:t>Modifiez le style du titre</a:t>
             </a:r>
-            <a:endParaRPr lang="fr-FR"/>
           </a:p>
         </p:txBody>
       </p:sp>
@@ -2875,7 +2864,6 @@
               <a:rPr lang="fr-FR"/>
               <a:t>Cinquième niveau</a:t>
             </a:r>
-            <a:endParaRPr lang="fr-FR"/>
           </a:p>
         </p:txBody>
       </p:sp>
@@ -3696,13 +3684,8 @@
           <a:p>
             <a:r>
               <a:rPr lang="fr-FR" dirty="0"/>
-              <a:t>FROM, </a:t>
-            </a:r>
-            <a:r>
-              <a:rPr lang="fr-FR" dirty="0"/>
-              <a:t>MAINTAINER, RUN, WORKDIR,USER, CMD, EXPOSE, VOLUME, ENV, COPY, ADD</a:t>
-            </a:r>
-            <a:endParaRPr lang="fr-FR" dirty="0"/>
+              <a:t>FROM, MAINTAINER, RUN, WORKDIR,USER, CMD, EXPOSE, VOLUME, ENV, COPY, ADD</a:t>
+            </a:r>
           </a:p>
           <a:p>
             <a:endParaRPr lang="fr-FR" dirty="0"/>
@@ -3756,6 +3739,1834 @@
 </file>
 
 <file path=ppt/slides/slide2.xml><?xml version="1.0" encoding="utf-8"?>
+<p:sld xmlns:a="http://schemas.openxmlformats.org/drawingml/2006/main" xmlns:r="http://schemas.openxmlformats.org/officeDocument/2006/relationships" xmlns:p="http://schemas.openxmlformats.org/presentationml/2006/main">
+  <p:cSld>
+    <p:spTree>
+      <p:nvGrpSpPr>
+        <p:cNvPr id="1" name=""/>
+        <p:cNvGrpSpPr/>
+        <p:nvPr/>
+      </p:nvGrpSpPr>
+      <p:grpSpPr>
+        <a:xfrm>
+          <a:off x="0" y="0"/>
+          <a:ext cx="0" cy="0"/>
+          <a:chOff x="0" y="0"/>
+          <a:chExt cx="0" cy="0"/>
+        </a:xfrm>
+      </p:grpSpPr>
+      <p:grpSp>
+        <p:nvGrpSpPr>
+          <p:cNvPr id="6" name="Groupe 5"/>
+          <p:cNvGrpSpPr/>
+          <p:nvPr/>
+        </p:nvGrpSpPr>
+        <p:grpSpPr>
+          <a:xfrm>
+            <a:off x="1772816" y="1408923"/>
+            <a:ext cx="3116425" cy="4189445"/>
+            <a:chOff x="1474237" y="1296955"/>
+            <a:chExt cx="2668555" cy="3844212"/>
+          </a:xfrm>
+        </p:grpSpPr>
+        <p:sp>
+          <p:nvSpPr>
+            <p:cNvPr id="4" name="Rectangle 3"/>
+            <p:cNvSpPr/>
+            <p:nvPr/>
+          </p:nvSpPr>
+          <p:spPr>
+            <a:xfrm>
+              <a:off x="1474237" y="1296955"/>
+              <a:ext cx="2668555" cy="3844212"/>
+            </a:xfrm>
+            <a:prstGeom prst="rect">
+              <a:avLst/>
+            </a:prstGeom>
+            <a:noFill/>
+            <a:ln w="57150">
+              <a:solidFill>
+                <a:schemeClr val="accent1">
+                  <a:lumMod val="75000"/>
+                </a:schemeClr>
+              </a:solidFill>
+            </a:ln>
+          </p:spPr>
+          <p:style>
+            <a:lnRef idx="2">
+              <a:schemeClr val="accent1">
+                <a:shade val="50000"/>
+              </a:schemeClr>
+            </a:lnRef>
+            <a:fillRef idx="1">
+              <a:schemeClr val="accent1"/>
+            </a:fillRef>
+            <a:effectRef idx="0">
+              <a:schemeClr val="accent1"/>
+            </a:effectRef>
+            <a:fontRef idx="minor">
+              <a:schemeClr val="lt1"/>
+            </a:fontRef>
+          </p:style>
+          <p:txBody>
+            <a:bodyPr rtlCol="0" anchor="ctr"/>
+            <a:lstStyle/>
+            <a:p>
+              <a:pPr algn="ctr"/>
+              <a:endParaRPr lang="fr-FR"/>
+            </a:p>
+          </p:txBody>
+        </p:sp>
+        <p:pic>
+          <p:nvPicPr>
+            <p:cNvPr id="1028" name="Picture 4" descr="https://secure.gravatar.com/avatar/26da7b36ff8bb5db4211400358dc7c4e.jpg?s=512&amp;r=g&amp;d=mm"/>
+            <p:cNvPicPr>
+              <a:picLocks noChangeAspect="1" noChangeArrowheads="1"/>
+            </p:cNvPicPr>
+            <p:nvPr/>
+          </p:nvPicPr>
+          <p:blipFill>
+            <a:blip r:embed="rId2">
+              <a:extLst>
+                <a:ext uri="{28A0092B-C50C-407E-A947-70E740481C1C}">
+                  <a14:useLocalDpi xmlns:a14="http://schemas.microsoft.com/office/drawing/2010/main" val="0"/>
+                </a:ext>
+              </a:extLst>
+            </a:blip>
+            <a:srcRect/>
+            <a:stretch>
+              <a:fillRect/>
+            </a:stretch>
+          </p:blipFill>
+          <p:spPr bwMode="auto">
+            <a:xfrm>
+              <a:off x="1985864" y="3220617"/>
+              <a:ext cx="1799253" cy="1799253"/>
+            </a:xfrm>
+            <a:prstGeom prst="rect">
+              <a:avLst/>
+            </a:prstGeom>
+            <a:noFill/>
+            <a:extLst>
+              <a:ext uri="{909E8E84-426E-40DD-AFC4-6F175D3DCCD1}">
+                <a14:hiddenFill xmlns:a14="http://schemas.microsoft.com/office/drawing/2010/main">
+                  <a:solidFill>
+                    <a:srgbClr val="FFFFFF"/>
+                  </a:solidFill>
+                </a14:hiddenFill>
+              </a:ext>
+            </a:extLst>
+          </p:spPr>
+        </p:pic>
+        <p:sp>
+          <p:nvSpPr>
+            <p:cNvPr id="5" name="Rectangle 4"/>
+            <p:cNvSpPr/>
+            <p:nvPr/>
+          </p:nvSpPr>
+          <p:spPr>
+            <a:xfrm>
+              <a:off x="1771260" y="1791479"/>
+              <a:ext cx="2100944" cy="102636"/>
+            </a:xfrm>
+            <a:prstGeom prst="rect">
+              <a:avLst/>
+            </a:prstGeom>
+            <a:solidFill>
+              <a:srgbClr val="00B0F0"/>
+            </a:solidFill>
+            <a:ln>
+              <a:solidFill>
+                <a:srgbClr val="00B0F0"/>
+              </a:solidFill>
+            </a:ln>
+          </p:spPr>
+          <p:style>
+            <a:lnRef idx="2">
+              <a:schemeClr val="accent1">
+                <a:shade val="50000"/>
+              </a:schemeClr>
+            </a:lnRef>
+            <a:fillRef idx="1">
+              <a:schemeClr val="accent1"/>
+            </a:fillRef>
+            <a:effectRef idx="0">
+              <a:schemeClr val="accent1"/>
+            </a:effectRef>
+            <a:fontRef idx="minor">
+              <a:schemeClr val="lt1"/>
+            </a:fontRef>
+          </p:style>
+          <p:txBody>
+            <a:bodyPr rtlCol="0" anchor="ctr"/>
+            <a:lstStyle/>
+            <a:p>
+              <a:pPr algn="ctr"/>
+              <a:endParaRPr lang="fr-FR"/>
+            </a:p>
+          </p:txBody>
+        </p:sp>
+        <p:sp>
+          <p:nvSpPr>
+            <p:cNvPr id="8" name="Rectangle 7"/>
+            <p:cNvSpPr/>
+            <p:nvPr/>
+          </p:nvSpPr>
+          <p:spPr>
+            <a:xfrm>
+              <a:off x="1771260" y="2058179"/>
+              <a:ext cx="2100944" cy="102636"/>
+            </a:xfrm>
+            <a:prstGeom prst="rect">
+              <a:avLst/>
+            </a:prstGeom>
+            <a:solidFill>
+              <a:srgbClr val="00B0F0"/>
+            </a:solidFill>
+            <a:ln>
+              <a:solidFill>
+                <a:srgbClr val="00B0F0"/>
+              </a:solidFill>
+            </a:ln>
+          </p:spPr>
+          <p:style>
+            <a:lnRef idx="2">
+              <a:schemeClr val="accent1">
+                <a:shade val="50000"/>
+              </a:schemeClr>
+            </a:lnRef>
+            <a:fillRef idx="1">
+              <a:schemeClr val="accent1"/>
+            </a:fillRef>
+            <a:effectRef idx="0">
+              <a:schemeClr val="accent1"/>
+            </a:effectRef>
+            <a:fontRef idx="minor">
+              <a:schemeClr val="lt1"/>
+            </a:fontRef>
+          </p:style>
+          <p:txBody>
+            <a:bodyPr rtlCol="0" anchor="ctr"/>
+            <a:lstStyle/>
+            <a:p>
+              <a:pPr algn="ctr"/>
+              <a:endParaRPr lang="fr-FR"/>
+            </a:p>
+          </p:txBody>
+        </p:sp>
+        <p:sp>
+          <p:nvSpPr>
+            <p:cNvPr id="9" name="Rectangle 8"/>
+            <p:cNvSpPr/>
+            <p:nvPr/>
+          </p:nvSpPr>
+          <p:spPr>
+            <a:xfrm>
+              <a:off x="1771260" y="2337321"/>
+              <a:ext cx="2100944" cy="102636"/>
+            </a:xfrm>
+            <a:prstGeom prst="rect">
+              <a:avLst/>
+            </a:prstGeom>
+            <a:solidFill>
+              <a:srgbClr val="00B0F0"/>
+            </a:solidFill>
+            <a:ln>
+              <a:solidFill>
+                <a:srgbClr val="00B0F0"/>
+              </a:solidFill>
+            </a:ln>
+          </p:spPr>
+          <p:style>
+            <a:lnRef idx="2">
+              <a:schemeClr val="accent1">
+                <a:shade val="50000"/>
+              </a:schemeClr>
+            </a:lnRef>
+            <a:fillRef idx="1">
+              <a:schemeClr val="accent1"/>
+            </a:fillRef>
+            <a:effectRef idx="0">
+              <a:schemeClr val="accent1"/>
+            </a:effectRef>
+            <a:fontRef idx="minor">
+              <a:schemeClr val="lt1"/>
+            </a:fontRef>
+          </p:style>
+          <p:txBody>
+            <a:bodyPr rtlCol="0" anchor="ctr"/>
+            <a:lstStyle/>
+            <a:p>
+              <a:pPr algn="ctr"/>
+              <a:endParaRPr lang="fr-FR"/>
+            </a:p>
+          </p:txBody>
+        </p:sp>
+        <p:sp>
+          <p:nvSpPr>
+            <p:cNvPr id="10" name="Rectangle 9"/>
+            <p:cNvSpPr/>
+            <p:nvPr/>
+          </p:nvSpPr>
+          <p:spPr>
+            <a:xfrm>
+              <a:off x="1771260" y="2642896"/>
+              <a:ext cx="2100944" cy="102636"/>
+            </a:xfrm>
+            <a:prstGeom prst="rect">
+              <a:avLst/>
+            </a:prstGeom>
+            <a:solidFill>
+              <a:srgbClr val="00B0F0"/>
+            </a:solidFill>
+            <a:ln>
+              <a:solidFill>
+                <a:srgbClr val="00B0F0"/>
+              </a:solidFill>
+            </a:ln>
+          </p:spPr>
+          <p:style>
+            <a:lnRef idx="2">
+              <a:schemeClr val="accent1">
+                <a:shade val="50000"/>
+              </a:schemeClr>
+            </a:lnRef>
+            <a:fillRef idx="1">
+              <a:schemeClr val="accent1"/>
+            </a:fillRef>
+            <a:effectRef idx="0">
+              <a:schemeClr val="accent1"/>
+            </a:effectRef>
+            <a:fontRef idx="minor">
+              <a:schemeClr val="lt1"/>
+            </a:fontRef>
+          </p:style>
+          <p:txBody>
+            <a:bodyPr rtlCol="0" anchor="ctr"/>
+            <a:lstStyle/>
+            <a:p>
+              <a:pPr algn="ctr"/>
+              <a:endParaRPr lang="fr-FR"/>
+            </a:p>
+          </p:txBody>
+        </p:sp>
+        <p:sp>
+          <p:nvSpPr>
+            <p:cNvPr id="11" name="Rectangle 10"/>
+            <p:cNvSpPr/>
+            <p:nvPr/>
+          </p:nvSpPr>
+          <p:spPr>
+            <a:xfrm>
+              <a:off x="1771260" y="2948471"/>
+              <a:ext cx="2100944" cy="102636"/>
+            </a:xfrm>
+            <a:prstGeom prst="rect">
+              <a:avLst/>
+            </a:prstGeom>
+            <a:solidFill>
+              <a:srgbClr val="00B0F0"/>
+            </a:solidFill>
+            <a:ln>
+              <a:solidFill>
+                <a:srgbClr val="00B0F0"/>
+              </a:solidFill>
+            </a:ln>
+          </p:spPr>
+          <p:style>
+            <a:lnRef idx="2">
+              <a:schemeClr val="accent1">
+                <a:shade val="50000"/>
+              </a:schemeClr>
+            </a:lnRef>
+            <a:fillRef idx="1">
+              <a:schemeClr val="accent1"/>
+            </a:fillRef>
+            <a:effectRef idx="0">
+              <a:schemeClr val="accent1"/>
+            </a:effectRef>
+            <a:fontRef idx="minor">
+              <a:schemeClr val="lt1"/>
+            </a:fontRef>
+          </p:style>
+          <p:txBody>
+            <a:bodyPr rtlCol="0" anchor="ctr"/>
+            <a:lstStyle/>
+            <a:p>
+              <a:pPr algn="ctr"/>
+              <a:endParaRPr lang="fr-FR"/>
+            </a:p>
+          </p:txBody>
+        </p:sp>
+      </p:grpSp>
+      <p:sp>
+        <p:nvSpPr>
+          <p:cNvPr id="7" name="ZoneTexte 6"/>
+          <p:cNvSpPr txBox="1"/>
+          <p:nvPr/>
+        </p:nvSpPr>
+        <p:spPr>
+          <a:xfrm>
+            <a:off x="6139543" y="1408923"/>
+            <a:ext cx="4516016" cy="4247317"/>
+          </a:xfrm>
+          <a:prstGeom prst="rect">
+            <a:avLst/>
+          </a:prstGeom>
+          <a:noFill/>
+        </p:spPr>
+        <p:txBody>
+          <a:bodyPr wrap="square" rtlCol="0">
+            <a:spAutoFit/>
+          </a:bodyPr>
+          <a:lstStyle/>
+          <a:p>
+            <a:endParaRPr lang="fr-FR" dirty="0"/>
+          </a:p>
+          <a:p>
+            <a:endParaRPr lang="fr-FR" dirty="0"/>
+          </a:p>
+          <a:p>
+            <a:endParaRPr lang="fr-FR" dirty="0"/>
+          </a:p>
+          <a:p>
+            <a:r>
+              <a:rPr lang="fr-FR" dirty="0"/>
+              <a:t>Syntaxe triviale</a:t>
+            </a:r>
+          </a:p>
+          <a:p>
+            <a:endParaRPr lang="fr-FR" dirty="0"/>
+          </a:p>
+          <a:p>
+            <a:endParaRPr lang="fr-FR" dirty="0"/>
+          </a:p>
+          <a:p>
+            <a:r>
+              <a:rPr lang="fr-FR" dirty="0"/>
+              <a:t>Self-</a:t>
+            </a:r>
+            <a:r>
+              <a:rPr lang="fr-FR" dirty="0" err="1"/>
+              <a:t>documented</a:t>
+            </a:r>
+            <a:r>
+              <a:rPr lang="fr-FR" dirty="0"/>
+              <a:t> ou « </a:t>
+            </a:r>
+            <a:r>
+              <a:rPr lang="fr-FR" dirty="0" err="1"/>
+              <a:t>autodocumenté</a:t>
+            </a:r>
+            <a:r>
+              <a:rPr lang="fr-FR" dirty="0"/>
+              <a:t> »</a:t>
+            </a:r>
+          </a:p>
+          <a:p>
+            <a:endParaRPr lang="fr-FR" dirty="0"/>
+          </a:p>
+          <a:p>
+            <a:endParaRPr lang="fr-FR" dirty="0"/>
+          </a:p>
+          <a:p>
+            <a:r>
+              <a:rPr lang="fr-FR" dirty="0"/>
+              <a:t>Peut être </a:t>
+            </a:r>
+            <a:r>
+              <a:rPr lang="fr-FR" dirty="0" err="1"/>
+              <a:t>versionné</a:t>
+            </a:r>
+            <a:endParaRPr lang="fr-FR" dirty="0"/>
+          </a:p>
+          <a:p>
+            <a:endParaRPr lang="fr-FR" dirty="0"/>
+          </a:p>
+          <a:p>
+            <a:endParaRPr lang="fr-FR" dirty="0"/>
+          </a:p>
+          <a:p>
+            <a:endParaRPr lang="fr-FR" dirty="0"/>
+          </a:p>
+          <a:p>
+            <a:endParaRPr lang="fr-FR" dirty="0"/>
+          </a:p>
+          <a:p>
+            <a:endParaRPr lang="fr-FR" dirty="0"/>
+          </a:p>
+        </p:txBody>
+      </p:sp>
+      <p:sp>
+        <p:nvSpPr>
+          <p:cNvPr id="13" name="ZoneTexte 12"/>
+          <p:cNvSpPr txBox="1"/>
+          <p:nvPr/>
+        </p:nvSpPr>
+        <p:spPr>
+          <a:xfrm>
+            <a:off x="755780" y="494522"/>
+            <a:ext cx="1131015" cy="369332"/>
+          </a:xfrm>
+          <a:prstGeom prst="rect">
+            <a:avLst/>
+          </a:prstGeom>
+          <a:noFill/>
+        </p:spPr>
+        <p:txBody>
+          <a:bodyPr wrap="none" rtlCol="0">
+            <a:spAutoFit/>
+          </a:bodyPr>
+          <a:lstStyle/>
+          <a:p>
+            <a:r>
+              <a:rPr lang="fr-FR" dirty="0" err="1"/>
+              <a:t>Dockerfile</a:t>
+            </a:r>
+            <a:endParaRPr lang="fr-FR" dirty="0"/>
+          </a:p>
+        </p:txBody>
+      </p:sp>
+    </p:spTree>
+    <p:extLst>
+      <p:ext uri="{BB962C8B-B14F-4D97-AF65-F5344CB8AC3E}">
+        <p14:creationId xmlns:p14="http://schemas.microsoft.com/office/powerpoint/2010/main" val="2172085349"/>
+      </p:ext>
+    </p:extLst>
+  </p:cSld>
+  <p:clrMapOvr>
+    <a:masterClrMapping/>
+  </p:clrMapOvr>
+</p:sld>
+</file>
+
+<file path=ppt/slides/slide3.xml><?xml version="1.0" encoding="utf-8"?>
+<p:sld xmlns:a="http://schemas.openxmlformats.org/drawingml/2006/main" xmlns:r="http://schemas.openxmlformats.org/officeDocument/2006/relationships" xmlns:p="http://schemas.openxmlformats.org/presentationml/2006/main">
+  <p:cSld>
+    <p:spTree>
+      <p:nvGrpSpPr>
+        <p:cNvPr id="1" name=""/>
+        <p:cNvGrpSpPr/>
+        <p:nvPr/>
+      </p:nvGrpSpPr>
+      <p:grpSpPr>
+        <a:xfrm>
+          <a:off x="0" y="0"/>
+          <a:ext cx="0" cy="0"/>
+          <a:chOff x="0" y="0"/>
+          <a:chExt cx="0" cy="0"/>
+        </a:xfrm>
+      </p:grpSpPr>
+      <p:grpSp>
+        <p:nvGrpSpPr>
+          <p:cNvPr id="6" name="Groupe 5"/>
+          <p:cNvGrpSpPr/>
+          <p:nvPr/>
+        </p:nvGrpSpPr>
+        <p:grpSpPr>
+          <a:xfrm>
+            <a:off x="1772816" y="1408923"/>
+            <a:ext cx="3116425" cy="4189445"/>
+            <a:chOff x="1474237" y="1296955"/>
+            <a:chExt cx="2668555" cy="3844212"/>
+          </a:xfrm>
+        </p:grpSpPr>
+        <p:sp>
+          <p:nvSpPr>
+            <p:cNvPr id="4" name="Rectangle 3"/>
+            <p:cNvSpPr/>
+            <p:nvPr/>
+          </p:nvSpPr>
+          <p:spPr>
+            <a:xfrm>
+              <a:off x="1474237" y="1296955"/>
+              <a:ext cx="2668555" cy="3844212"/>
+            </a:xfrm>
+            <a:prstGeom prst="rect">
+              <a:avLst/>
+            </a:prstGeom>
+            <a:noFill/>
+            <a:ln w="57150">
+              <a:solidFill>
+                <a:schemeClr val="accent1">
+                  <a:lumMod val="75000"/>
+                </a:schemeClr>
+              </a:solidFill>
+            </a:ln>
+          </p:spPr>
+          <p:style>
+            <a:lnRef idx="2">
+              <a:schemeClr val="accent1">
+                <a:shade val="50000"/>
+              </a:schemeClr>
+            </a:lnRef>
+            <a:fillRef idx="1">
+              <a:schemeClr val="accent1"/>
+            </a:fillRef>
+            <a:effectRef idx="0">
+              <a:schemeClr val="accent1"/>
+            </a:effectRef>
+            <a:fontRef idx="minor">
+              <a:schemeClr val="lt1"/>
+            </a:fontRef>
+          </p:style>
+          <p:txBody>
+            <a:bodyPr rtlCol="0" anchor="ctr"/>
+            <a:lstStyle/>
+            <a:p>
+              <a:pPr algn="ctr"/>
+              <a:endParaRPr lang="fr-FR"/>
+            </a:p>
+          </p:txBody>
+        </p:sp>
+        <p:pic>
+          <p:nvPicPr>
+            <p:cNvPr id="1028" name="Picture 4" descr="https://secure.gravatar.com/avatar/26da7b36ff8bb5db4211400358dc7c4e.jpg?s=512&amp;r=g&amp;d=mm"/>
+            <p:cNvPicPr>
+              <a:picLocks noChangeAspect="1" noChangeArrowheads="1"/>
+            </p:cNvPicPr>
+            <p:nvPr/>
+          </p:nvPicPr>
+          <p:blipFill>
+            <a:blip r:embed="rId2">
+              <a:extLst>
+                <a:ext uri="{28A0092B-C50C-407E-A947-70E740481C1C}">
+                  <a14:useLocalDpi xmlns:a14="http://schemas.microsoft.com/office/drawing/2010/main" val="0"/>
+                </a:ext>
+              </a:extLst>
+            </a:blip>
+            <a:srcRect/>
+            <a:stretch>
+              <a:fillRect/>
+            </a:stretch>
+          </p:blipFill>
+          <p:spPr bwMode="auto">
+            <a:xfrm>
+              <a:off x="1985864" y="3220617"/>
+              <a:ext cx="1799253" cy="1799253"/>
+            </a:xfrm>
+            <a:prstGeom prst="rect">
+              <a:avLst/>
+            </a:prstGeom>
+            <a:noFill/>
+            <a:extLst>
+              <a:ext uri="{909E8E84-426E-40DD-AFC4-6F175D3DCCD1}">
+                <a14:hiddenFill xmlns:a14="http://schemas.microsoft.com/office/drawing/2010/main">
+                  <a:solidFill>
+                    <a:srgbClr val="FFFFFF"/>
+                  </a:solidFill>
+                </a14:hiddenFill>
+              </a:ext>
+            </a:extLst>
+          </p:spPr>
+        </p:pic>
+        <p:sp>
+          <p:nvSpPr>
+            <p:cNvPr id="5" name="Rectangle 4"/>
+            <p:cNvSpPr/>
+            <p:nvPr/>
+          </p:nvSpPr>
+          <p:spPr>
+            <a:xfrm>
+              <a:off x="1771260" y="1791479"/>
+              <a:ext cx="2100944" cy="102636"/>
+            </a:xfrm>
+            <a:prstGeom prst="rect">
+              <a:avLst/>
+            </a:prstGeom>
+            <a:solidFill>
+              <a:srgbClr val="00B0F0"/>
+            </a:solidFill>
+            <a:ln>
+              <a:solidFill>
+                <a:srgbClr val="00B0F0"/>
+              </a:solidFill>
+            </a:ln>
+          </p:spPr>
+          <p:style>
+            <a:lnRef idx="2">
+              <a:schemeClr val="accent1">
+                <a:shade val="50000"/>
+              </a:schemeClr>
+            </a:lnRef>
+            <a:fillRef idx="1">
+              <a:schemeClr val="accent1"/>
+            </a:fillRef>
+            <a:effectRef idx="0">
+              <a:schemeClr val="accent1"/>
+            </a:effectRef>
+            <a:fontRef idx="minor">
+              <a:schemeClr val="lt1"/>
+            </a:fontRef>
+          </p:style>
+          <p:txBody>
+            <a:bodyPr rtlCol="0" anchor="ctr"/>
+            <a:lstStyle/>
+            <a:p>
+              <a:pPr algn="ctr"/>
+              <a:endParaRPr lang="fr-FR"/>
+            </a:p>
+          </p:txBody>
+        </p:sp>
+        <p:sp>
+          <p:nvSpPr>
+            <p:cNvPr id="8" name="Rectangle 7"/>
+            <p:cNvSpPr/>
+            <p:nvPr/>
+          </p:nvSpPr>
+          <p:spPr>
+            <a:xfrm>
+              <a:off x="1771260" y="2058179"/>
+              <a:ext cx="2100944" cy="102636"/>
+            </a:xfrm>
+            <a:prstGeom prst="rect">
+              <a:avLst/>
+            </a:prstGeom>
+            <a:solidFill>
+              <a:srgbClr val="00B0F0"/>
+            </a:solidFill>
+            <a:ln>
+              <a:solidFill>
+                <a:srgbClr val="00B0F0"/>
+              </a:solidFill>
+            </a:ln>
+          </p:spPr>
+          <p:style>
+            <a:lnRef idx="2">
+              <a:schemeClr val="accent1">
+                <a:shade val="50000"/>
+              </a:schemeClr>
+            </a:lnRef>
+            <a:fillRef idx="1">
+              <a:schemeClr val="accent1"/>
+            </a:fillRef>
+            <a:effectRef idx="0">
+              <a:schemeClr val="accent1"/>
+            </a:effectRef>
+            <a:fontRef idx="minor">
+              <a:schemeClr val="lt1"/>
+            </a:fontRef>
+          </p:style>
+          <p:txBody>
+            <a:bodyPr rtlCol="0" anchor="ctr"/>
+            <a:lstStyle/>
+            <a:p>
+              <a:pPr algn="ctr"/>
+              <a:endParaRPr lang="fr-FR"/>
+            </a:p>
+          </p:txBody>
+        </p:sp>
+        <p:sp>
+          <p:nvSpPr>
+            <p:cNvPr id="9" name="Rectangle 8"/>
+            <p:cNvSpPr/>
+            <p:nvPr/>
+          </p:nvSpPr>
+          <p:spPr>
+            <a:xfrm>
+              <a:off x="1771260" y="2337321"/>
+              <a:ext cx="2100944" cy="102636"/>
+            </a:xfrm>
+            <a:prstGeom prst="rect">
+              <a:avLst/>
+            </a:prstGeom>
+            <a:solidFill>
+              <a:srgbClr val="00B0F0"/>
+            </a:solidFill>
+            <a:ln>
+              <a:solidFill>
+                <a:srgbClr val="00B0F0"/>
+              </a:solidFill>
+            </a:ln>
+          </p:spPr>
+          <p:style>
+            <a:lnRef idx="2">
+              <a:schemeClr val="accent1">
+                <a:shade val="50000"/>
+              </a:schemeClr>
+            </a:lnRef>
+            <a:fillRef idx="1">
+              <a:schemeClr val="accent1"/>
+            </a:fillRef>
+            <a:effectRef idx="0">
+              <a:schemeClr val="accent1"/>
+            </a:effectRef>
+            <a:fontRef idx="minor">
+              <a:schemeClr val="lt1"/>
+            </a:fontRef>
+          </p:style>
+          <p:txBody>
+            <a:bodyPr rtlCol="0" anchor="ctr"/>
+            <a:lstStyle/>
+            <a:p>
+              <a:pPr algn="ctr"/>
+              <a:endParaRPr lang="fr-FR"/>
+            </a:p>
+          </p:txBody>
+        </p:sp>
+        <p:sp>
+          <p:nvSpPr>
+            <p:cNvPr id="10" name="Rectangle 9"/>
+            <p:cNvSpPr/>
+            <p:nvPr/>
+          </p:nvSpPr>
+          <p:spPr>
+            <a:xfrm>
+              <a:off x="1771260" y="2642896"/>
+              <a:ext cx="2100944" cy="102636"/>
+            </a:xfrm>
+            <a:prstGeom prst="rect">
+              <a:avLst/>
+            </a:prstGeom>
+            <a:solidFill>
+              <a:srgbClr val="00B0F0"/>
+            </a:solidFill>
+            <a:ln>
+              <a:solidFill>
+                <a:srgbClr val="00B0F0"/>
+              </a:solidFill>
+            </a:ln>
+          </p:spPr>
+          <p:style>
+            <a:lnRef idx="2">
+              <a:schemeClr val="accent1">
+                <a:shade val="50000"/>
+              </a:schemeClr>
+            </a:lnRef>
+            <a:fillRef idx="1">
+              <a:schemeClr val="accent1"/>
+            </a:fillRef>
+            <a:effectRef idx="0">
+              <a:schemeClr val="accent1"/>
+            </a:effectRef>
+            <a:fontRef idx="minor">
+              <a:schemeClr val="lt1"/>
+            </a:fontRef>
+          </p:style>
+          <p:txBody>
+            <a:bodyPr rtlCol="0" anchor="ctr"/>
+            <a:lstStyle/>
+            <a:p>
+              <a:pPr algn="ctr"/>
+              <a:endParaRPr lang="fr-FR"/>
+            </a:p>
+          </p:txBody>
+        </p:sp>
+        <p:sp>
+          <p:nvSpPr>
+            <p:cNvPr id="11" name="Rectangle 10"/>
+            <p:cNvSpPr/>
+            <p:nvPr/>
+          </p:nvSpPr>
+          <p:spPr>
+            <a:xfrm>
+              <a:off x="1771260" y="2948471"/>
+              <a:ext cx="2100944" cy="102636"/>
+            </a:xfrm>
+            <a:prstGeom prst="rect">
+              <a:avLst/>
+            </a:prstGeom>
+            <a:solidFill>
+              <a:srgbClr val="00B0F0"/>
+            </a:solidFill>
+            <a:ln>
+              <a:solidFill>
+                <a:srgbClr val="00B0F0"/>
+              </a:solidFill>
+            </a:ln>
+          </p:spPr>
+          <p:style>
+            <a:lnRef idx="2">
+              <a:schemeClr val="accent1">
+                <a:shade val="50000"/>
+              </a:schemeClr>
+            </a:lnRef>
+            <a:fillRef idx="1">
+              <a:schemeClr val="accent1"/>
+            </a:fillRef>
+            <a:effectRef idx="0">
+              <a:schemeClr val="accent1"/>
+            </a:effectRef>
+            <a:fontRef idx="minor">
+              <a:schemeClr val="lt1"/>
+            </a:fontRef>
+          </p:style>
+          <p:txBody>
+            <a:bodyPr rtlCol="0" anchor="ctr"/>
+            <a:lstStyle/>
+            <a:p>
+              <a:pPr algn="ctr"/>
+              <a:endParaRPr lang="fr-FR"/>
+            </a:p>
+          </p:txBody>
+        </p:sp>
+      </p:grpSp>
+      <p:sp>
+        <p:nvSpPr>
+          <p:cNvPr id="7" name="ZoneTexte 6"/>
+          <p:cNvSpPr txBox="1"/>
+          <p:nvPr/>
+        </p:nvSpPr>
+        <p:spPr>
+          <a:xfrm>
+            <a:off x="5323871" y="2350362"/>
+            <a:ext cx="6403174" cy="2585323"/>
+          </a:xfrm>
+          <a:prstGeom prst="rect">
+            <a:avLst/>
+          </a:prstGeom>
+          <a:solidFill>
+            <a:schemeClr val="bg1">
+              <a:lumMod val="95000"/>
+            </a:schemeClr>
+          </a:solidFill>
+        </p:spPr>
+        <p:txBody>
+          <a:bodyPr wrap="square" rtlCol="0">
+            <a:spAutoFit/>
+          </a:bodyPr>
+          <a:lstStyle/>
+          <a:p>
+            <a:r>
+              <a:rPr lang="fr-FR" sz="1400" dirty="0">
+                <a:latin typeface="Courier New" panose="02070309020205020404" pitchFamily="49" charset="0"/>
+                <a:cs typeface="Courier New" panose="02070309020205020404" pitchFamily="49" charset="0"/>
+              </a:rPr>
+              <a:t>FROM </a:t>
+            </a:r>
+            <a:r>
+              <a:rPr lang="fr-FR" sz="1400" dirty="0" err="1">
+                <a:latin typeface="Courier New" panose="02070309020205020404" pitchFamily="49" charset="0"/>
+                <a:cs typeface="Courier New" panose="02070309020205020404" pitchFamily="49" charset="0"/>
+              </a:rPr>
+              <a:t>ubuntu</a:t>
+            </a:r>
+            <a:endParaRPr lang="fr-FR" sz="1400" dirty="0">
+              <a:latin typeface="Courier New" panose="02070309020205020404" pitchFamily="49" charset="0"/>
+              <a:cs typeface="Courier New" panose="02070309020205020404" pitchFamily="49" charset="0"/>
+            </a:endParaRPr>
+          </a:p>
+          <a:p>
+            <a:endParaRPr lang="fr-FR" sz="1400" dirty="0">
+              <a:latin typeface="Courier New" panose="02070309020205020404" pitchFamily="49" charset="0"/>
+              <a:cs typeface="Courier New" panose="02070309020205020404" pitchFamily="49" charset="0"/>
+            </a:endParaRPr>
+          </a:p>
+          <a:p>
+            <a:r>
+              <a:rPr lang="fr-FR" sz="1400" dirty="0">
+                <a:latin typeface="Courier New" panose="02070309020205020404" pitchFamily="49" charset="0"/>
+                <a:cs typeface="Courier New" panose="02070309020205020404" pitchFamily="49" charset="0"/>
+              </a:rPr>
+              <a:t>RUN </a:t>
+            </a:r>
+            <a:r>
+              <a:rPr lang="fr-FR" sz="1400" dirty="0" err="1">
+                <a:latin typeface="Courier New" panose="02070309020205020404" pitchFamily="49" charset="0"/>
+                <a:cs typeface="Courier New" panose="02070309020205020404" pitchFamily="49" charset="0"/>
+              </a:rPr>
+              <a:t>apt-get</a:t>
+            </a:r>
+            <a:r>
+              <a:rPr lang="fr-FR" sz="1400" dirty="0">
+                <a:latin typeface="Courier New" panose="02070309020205020404" pitchFamily="49" charset="0"/>
+                <a:cs typeface="Courier New" panose="02070309020205020404" pitchFamily="49" charset="0"/>
+              </a:rPr>
+              <a:t> –y </a:t>
+            </a:r>
+            <a:r>
+              <a:rPr lang="fr-FR" sz="1400" dirty="0" err="1">
+                <a:latin typeface="Courier New" panose="02070309020205020404" pitchFamily="49" charset="0"/>
+                <a:cs typeface="Courier New" panose="02070309020205020404" pitchFamily="49" charset="0"/>
+              </a:rPr>
+              <a:t>install</a:t>
+            </a:r>
+            <a:r>
+              <a:rPr lang="fr-FR" sz="1400" dirty="0">
+                <a:latin typeface="Courier New" panose="02070309020205020404" pitchFamily="49" charset="0"/>
+                <a:cs typeface="Courier New" panose="02070309020205020404" pitchFamily="49" charset="0"/>
+              </a:rPr>
+              <a:t> apache2 &amp;&amp; </a:t>
+            </a:r>
+            <a:r>
+              <a:rPr lang="fr-FR" sz="1400" dirty="0" err="1">
+                <a:latin typeface="Courier New" panose="02070309020205020404" pitchFamily="49" charset="0"/>
+                <a:cs typeface="Courier New" panose="02070309020205020404" pitchFamily="49" charset="0"/>
+              </a:rPr>
+              <a:t>apt-get</a:t>
+            </a:r>
+            <a:r>
+              <a:rPr lang="fr-FR" sz="1400" dirty="0">
+                <a:latin typeface="Courier New" panose="02070309020205020404" pitchFamily="49" charset="0"/>
+                <a:cs typeface="Courier New" panose="02070309020205020404" pitchFamily="49" charset="0"/>
+              </a:rPr>
+              <a:t> clean</a:t>
+            </a:r>
+          </a:p>
+          <a:p>
+            <a:endParaRPr lang="fr-FR" sz="1400" dirty="0">
+              <a:latin typeface="Courier New" panose="02070309020205020404" pitchFamily="49" charset="0"/>
+              <a:cs typeface="Courier New" panose="02070309020205020404" pitchFamily="49" charset="0"/>
+            </a:endParaRPr>
+          </a:p>
+          <a:p>
+            <a:r>
+              <a:rPr lang="fr-FR" sz="1400" dirty="0">
+                <a:latin typeface="Courier New" panose="02070309020205020404" pitchFamily="49" charset="0"/>
+                <a:cs typeface="Courier New" panose="02070309020205020404" pitchFamily="49" charset="0"/>
+              </a:rPr>
+              <a:t>ADD </a:t>
+            </a:r>
+            <a:r>
+              <a:rPr lang="fr-FR" sz="1400" dirty="0" err="1">
+                <a:latin typeface="Courier New" panose="02070309020205020404" pitchFamily="49" charset="0"/>
+                <a:cs typeface="Courier New" panose="02070309020205020404" pitchFamily="49" charset="0"/>
+              </a:rPr>
+              <a:t>default.conf</a:t>
+            </a:r>
+            <a:r>
+              <a:rPr lang="fr-FR" sz="1400" dirty="0">
+                <a:latin typeface="Courier New" panose="02070309020205020404" pitchFamily="49" charset="0"/>
+                <a:cs typeface="Courier New" panose="02070309020205020404" pitchFamily="49" charset="0"/>
+              </a:rPr>
+              <a:t> /</a:t>
+            </a:r>
+            <a:r>
+              <a:rPr lang="fr-FR" sz="1400" dirty="0" err="1">
+                <a:latin typeface="Courier New" panose="02070309020205020404" pitchFamily="49" charset="0"/>
+                <a:cs typeface="Courier New" panose="02070309020205020404" pitchFamily="49" charset="0"/>
+              </a:rPr>
+              <a:t>etc</a:t>
+            </a:r>
+            <a:r>
+              <a:rPr lang="fr-FR" sz="1400" dirty="0">
+                <a:latin typeface="Courier New" panose="02070309020205020404" pitchFamily="49" charset="0"/>
+                <a:cs typeface="Courier New" panose="02070309020205020404" pitchFamily="49" charset="0"/>
+              </a:rPr>
+              <a:t>/apache2/sites-</a:t>
+            </a:r>
+            <a:r>
+              <a:rPr lang="fr-FR" sz="1400" dirty="0" err="1">
+                <a:latin typeface="Courier New" panose="02070309020205020404" pitchFamily="49" charset="0"/>
+                <a:cs typeface="Courier New" panose="02070309020205020404" pitchFamily="49" charset="0"/>
+              </a:rPr>
+              <a:t>available</a:t>
+            </a:r>
+            <a:r>
+              <a:rPr lang="fr-FR" sz="1400" dirty="0">
+                <a:latin typeface="Courier New" panose="02070309020205020404" pitchFamily="49" charset="0"/>
+                <a:cs typeface="Courier New" panose="02070309020205020404" pitchFamily="49" charset="0"/>
+              </a:rPr>
+              <a:t>/</a:t>
+            </a:r>
+            <a:r>
+              <a:rPr lang="fr-FR" sz="1400" dirty="0" err="1">
+                <a:latin typeface="Courier New" panose="02070309020205020404" pitchFamily="49" charset="0"/>
+                <a:cs typeface="Courier New" panose="02070309020205020404" pitchFamily="49" charset="0"/>
+              </a:rPr>
+              <a:t>default.conf</a:t>
+            </a:r>
+            <a:endParaRPr lang="fr-FR" sz="1400" dirty="0">
+              <a:latin typeface="Courier New" panose="02070309020205020404" pitchFamily="49" charset="0"/>
+              <a:cs typeface="Courier New" panose="02070309020205020404" pitchFamily="49" charset="0"/>
+            </a:endParaRPr>
+          </a:p>
+          <a:p>
+            <a:endParaRPr lang="fr-FR" sz="1400" dirty="0">
+              <a:latin typeface="Courier New" panose="02070309020205020404" pitchFamily="49" charset="0"/>
+              <a:cs typeface="Courier New" panose="02070309020205020404" pitchFamily="49" charset="0"/>
+            </a:endParaRPr>
+          </a:p>
+          <a:p>
+            <a:r>
+              <a:rPr lang="fr-FR" sz="1400" dirty="0">
+                <a:latin typeface="Courier New" panose="02070309020205020404" pitchFamily="49" charset="0"/>
+                <a:cs typeface="Courier New" panose="02070309020205020404" pitchFamily="49" charset="0"/>
+              </a:rPr>
+              <a:t>EXPOSE 80</a:t>
+            </a:r>
+          </a:p>
+          <a:p>
+            <a:endParaRPr lang="fr-FR" sz="1400" dirty="0">
+              <a:latin typeface="Courier New" panose="02070309020205020404" pitchFamily="49" charset="0"/>
+              <a:cs typeface="Courier New" panose="02070309020205020404" pitchFamily="49" charset="0"/>
+            </a:endParaRPr>
+          </a:p>
+          <a:p>
+            <a:r>
+              <a:rPr lang="fr-FR" sz="1400" dirty="0">
+                <a:latin typeface="Courier New" panose="02070309020205020404" pitchFamily="49" charset="0"/>
+                <a:cs typeface="Courier New" panose="02070309020205020404" pitchFamily="49" charset="0"/>
+              </a:rPr>
+              <a:t>CMD ["/</a:t>
+            </a:r>
+            <a:r>
+              <a:rPr lang="fr-FR" sz="1400" dirty="0" err="1">
+                <a:latin typeface="Courier New" panose="02070309020205020404" pitchFamily="49" charset="0"/>
+                <a:cs typeface="Courier New" panose="02070309020205020404" pitchFamily="49" charset="0"/>
+              </a:rPr>
+              <a:t>usr</a:t>
+            </a:r>
+            <a:r>
+              <a:rPr lang="fr-FR" sz="1400" dirty="0">
+                <a:latin typeface="Courier New" panose="02070309020205020404" pitchFamily="49" charset="0"/>
+                <a:cs typeface="Courier New" panose="02070309020205020404" pitchFamily="49" charset="0"/>
+              </a:rPr>
+              <a:t>/</a:t>
+            </a:r>
+            <a:r>
+              <a:rPr lang="fr-FR" sz="1400" dirty="0" err="1">
+                <a:latin typeface="Courier New" panose="02070309020205020404" pitchFamily="49" charset="0"/>
+                <a:cs typeface="Courier New" panose="02070309020205020404" pitchFamily="49" charset="0"/>
+              </a:rPr>
+              <a:t>sbin</a:t>
+            </a:r>
+            <a:r>
+              <a:rPr lang="fr-FR" sz="1400" dirty="0">
+                <a:latin typeface="Courier New" panose="02070309020205020404" pitchFamily="49" charset="0"/>
+                <a:cs typeface="Courier New" panose="02070309020205020404" pitchFamily="49" charset="0"/>
+              </a:rPr>
+              <a:t>/apache2ctl", "-D", "FOREGROUND"]</a:t>
+            </a:r>
+          </a:p>
+          <a:p>
+            <a:endParaRPr lang="fr-FR" dirty="0"/>
+          </a:p>
+          <a:p>
+            <a:endParaRPr lang="fr-FR" dirty="0"/>
+          </a:p>
+        </p:txBody>
+      </p:sp>
+      <p:sp>
+        <p:nvSpPr>
+          <p:cNvPr id="13" name="ZoneTexte 12"/>
+          <p:cNvSpPr txBox="1"/>
+          <p:nvPr/>
+        </p:nvSpPr>
+        <p:spPr>
+          <a:xfrm>
+            <a:off x="755780" y="494522"/>
+            <a:ext cx="1131015" cy="369332"/>
+          </a:xfrm>
+          <a:prstGeom prst="rect">
+            <a:avLst/>
+          </a:prstGeom>
+          <a:noFill/>
+        </p:spPr>
+        <p:txBody>
+          <a:bodyPr wrap="none" rtlCol="0">
+            <a:spAutoFit/>
+          </a:bodyPr>
+          <a:lstStyle/>
+          <a:p>
+            <a:r>
+              <a:rPr lang="fr-FR" dirty="0" err="1"/>
+              <a:t>Dockerfile</a:t>
+            </a:r>
+            <a:endParaRPr lang="fr-FR" dirty="0"/>
+          </a:p>
+        </p:txBody>
+      </p:sp>
+    </p:spTree>
+    <p:extLst>
+      <p:ext uri="{BB962C8B-B14F-4D97-AF65-F5344CB8AC3E}">
+        <p14:creationId xmlns:p14="http://schemas.microsoft.com/office/powerpoint/2010/main" val="1542184416"/>
+      </p:ext>
+    </p:extLst>
+  </p:cSld>
+  <p:clrMapOvr>
+    <a:masterClrMapping/>
+  </p:clrMapOvr>
+</p:sld>
+</file>
+
+<file path=ppt/slides/slide4.xml><?xml version="1.0" encoding="utf-8"?>
+<p:sld xmlns:a="http://schemas.openxmlformats.org/drawingml/2006/main" xmlns:r="http://schemas.openxmlformats.org/officeDocument/2006/relationships" xmlns:p="http://schemas.openxmlformats.org/presentationml/2006/main">
+  <p:cSld>
+    <p:spTree>
+      <p:nvGrpSpPr>
+        <p:cNvPr id="1" name=""/>
+        <p:cNvGrpSpPr/>
+        <p:nvPr/>
+      </p:nvGrpSpPr>
+      <p:grpSpPr>
+        <a:xfrm>
+          <a:off x="0" y="0"/>
+          <a:ext cx="0" cy="0"/>
+          <a:chOff x="0" y="0"/>
+          <a:chExt cx="0" cy="0"/>
+        </a:xfrm>
+      </p:grpSpPr>
+      <p:grpSp>
+        <p:nvGrpSpPr>
+          <p:cNvPr id="6" name="Groupe 5"/>
+          <p:cNvGrpSpPr/>
+          <p:nvPr/>
+        </p:nvGrpSpPr>
+        <p:grpSpPr>
+          <a:xfrm>
+            <a:off x="1772816" y="1408923"/>
+            <a:ext cx="3116425" cy="4189445"/>
+            <a:chOff x="1474237" y="1296955"/>
+            <a:chExt cx="2668555" cy="3844212"/>
+          </a:xfrm>
+        </p:grpSpPr>
+        <p:sp>
+          <p:nvSpPr>
+            <p:cNvPr id="4" name="Rectangle 3"/>
+            <p:cNvSpPr/>
+            <p:nvPr/>
+          </p:nvSpPr>
+          <p:spPr>
+            <a:xfrm>
+              <a:off x="1474237" y="1296955"/>
+              <a:ext cx="2668555" cy="3844212"/>
+            </a:xfrm>
+            <a:prstGeom prst="rect">
+              <a:avLst/>
+            </a:prstGeom>
+            <a:noFill/>
+            <a:ln w="57150">
+              <a:solidFill>
+                <a:schemeClr val="accent1">
+                  <a:lumMod val="75000"/>
+                </a:schemeClr>
+              </a:solidFill>
+            </a:ln>
+          </p:spPr>
+          <p:style>
+            <a:lnRef idx="2">
+              <a:schemeClr val="accent1">
+                <a:shade val="50000"/>
+              </a:schemeClr>
+            </a:lnRef>
+            <a:fillRef idx="1">
+              <a:schemeClr val="accent1"/>
+            </a:fillRef>
+            <a:effectRef idx="0">
+              <a:schemeClr val="accent1"/>
+            </a:effectRef>
+            <a:fontRef idx="minor">
+              <a:schemeClr val="lt1"/>
+            </a:fontRef>
+          </p:style>
+          <p:txBody>
+            <a:bodyPr rtlCol="0" anchor="ctr"/>
+            <a:lstStyle/>
+            <a:p>
+              <a:pPr algn="ctr"/>
+              <a:endParaRPr lang="fr-FR"/>
+            </a:p>
+          </p:txBody>
+        </p:sp>
+        <p:pic>
+          <p:nvPicPr>
+            <p:cNvPr id="1028" name="Picture 4" descr="https://secure.gravatar.com/avatar/26da7b36ff8bb5db4211400358dc7c4e.jpg?s=512&amp;r=g&amp;d=mm"/>
+            <p:cNvPicPr>
+              <a:picLocks noChangeAspect="1" noChangeArrowheads="1"/>
+            </p:cNvPicPr>
+            <p:nvPr/>
+          </p:nvPicPr>
+          <p:blipFill>
+            <a:blip r:embed="rId2">
+              <a:extLst>
+                <a:ext uri="{28A0092B-C50C-407E-A947-70E740481C1C}">
+                  <a14:useLocalDpi xmlns:a14="http://schemas.microsoft.com/office/drawing/2010/main" val="0"/>
+                </a:ext>
+              </a:extLst>
+            </a:blip>
+            <a:srcRect/>
+            <a:stretch>
+              <a:fillRect/>
+            </a:stretch>
+          </p:blipFill>
+          <p:spPr bwMode="auto">
+            <a:xfrm>
+              <a:off x="1985864" y="3220617"/>
+              <a:ext cx="1799253" cy="1799253"/>
+            </a:xfrm>
+            <a:prstGeom prst="rect">
+              <a:avLst/>
+            </a:prstGeom>
+            <a:noFill/>
+            <a:extLst>
+              <a:ext uri="{909E8E84-426E-40DD-AFC4-6F175D3DCCD1}">
+                <a14:hiddenFill xmlns:a14="http://schemas.microsoft.com/office/drawing/2010/main">
+                  <a:solidFill>
+                    <a:srgbClr val="FFFFFF"/>
+                  </a:solidFill>
+                </a14:hiddenFill>
+              </a:ext>
+            </a:extLst>
+          </p:spPr>
+        </p:pic>
+        <p:sp>
+          <p:nvSpPr>
+            <p:cNvPr id="5" name="Rectangle 4"/>
+            <p:cNvSpPr/>
+            <p:nvPr/>
+          </p:nvSpPr>
+          <p:spPr>
+            <a:xfrm>
+              <a:off x="1771260" y="1791479"/>
+              <a:ext cx="2100944" cy="102636"/>
+            </a:xfrm>
+            <a:prstGeom prst="rect">
+              <a:avLst/>
+            </a:prstGeom>
+            <a:solidFill>
+              <a:srgbClr val="00B0F0"/>
+            </a:solidFill>
+            <a:ln>
+              <a:solidFill>
+                <a:srgbClr val="00B0F0"/>
+              </a:solidFill>
+            </a:ln>
+          </p:spPr>
+          <p:style>
+            <a:lnRef idx="2">
+              <a:schemeClr val="accent1">
+                <a:shade val="50000"/>
+              </a:schemeClr>
+            </a:lnRef>
+            <a:fillRef idx="1">
+              <a:schemeClr val="accent1"/>
+            </a:fillRef>
+            <a:effectRef idx="0">
+              <a:schemeClr val="accent1"/>
+            </a:effectRef>
+            <a:fontRef idx="minor">
+              <a:schemeClr val="lt1"/>
+            </a:fontRef>
+          </p:style>
+          <p:txBody>
+            <a:bodyPr rtlCol="0" anchor="ctr"/>
+            <a:lstStyle/>
+            <a:p>
+              <a:pPr algn="ctr"/>
+              <a:endParaRPr lang="fr-FR"/>
+            </a:p>
+          </p:txBody>
+        </p:sp>
+        <p:sp>
+          <p:nvSpPr>
+            <p:cNvPr id="8" name="Rectangle 7"/>
+            <p:cNvSpPr/>
+            <p:nvPr/>
+          </p:nvSpPr>
+          <p:spPr>
+            <a:xfrm>
+              <a:off x="1771260" y="2058179"/>
+              <a:ext cx="2100944" cy="102636"/>
+            </a:xfrm>
+            <a:prstGeom prst="rect">
+              <a:avLst/>
+            </a:prstGeom>
+            <a:solidFill>
+              <a:srgbClr val="00B0F0"/>
+            </a:solidFill>
+            <a:ln>
+              <a:solidFill>
+                <a:srgbClr val="00B0F0"/>
+              </a:solidFill>
+            </a:ln>
+          </p:spPr>
+          <p:style>
+            <a:lnRef idx="2">
+              <a:schemeClr val="accent1">
+                <a:shade val="50000"/>
+              </a:schemeClr>
+            </a:lnRef>
+            <a:fillRef idx="1">
+              <a:schemeClr val="accent1"/>
+            </a:fillRef>
+            <a:effectRef idx="0">
+              <a:schemeClr val="accent1"/>
+            </a:effectRef>
+            <a:fontRef idx="minor">
+              <a:schemeClr val="lt1"/>
+            </a:fontRef>
+          </p:style>
+          <p:txBody>
+            <a:bodyPr rtlCol="0" anchor="ctr"/>
+            <a:lstStyle/>
+            <a:p>
+              <a:pPr algn="ctr"/>
+              <a:endParaRPr lang="fr-FR"/>
+            </a:p>
+          </p:txBody>
+        </p:sp>
+        <p:sp>
+          <p:nvSpPr>
+            <p:cNvPr id="9" name="Rectangle 8"/>
+            <p:cNvSpPr/>
+            <p:nvPr/>
+          </p:nvSpPr>
+          <p:spPr>
+            <a:xfrm>
+              <a:off x="1771260" y="2337321"/>
+              <a:ext cx="2100944" cy="102636"/>
+            </a:xfrm>
+            <a:prstGeom prst="rect">
+              <a:avLst/>
+            </a:prstGeom>
+            <a:solidFill>
+              <a:srgbClr val="00B0F0"/>
+            </a:solidFill>
+            <a:ln>
+              <a:solidFill>
+                <a:srgbClr val="00B0F0"/>
+              </a:solidFill>
+            </a:ln>
+          </p:spPr>
+          <p:style>
+            <a:lnRef idx="2">
+              <a:schemeClr val="accent1">
+                <a:shade val="50000"/>
+              </a:schemeClr>
+            </a:lnRef>
+            <a:fillRef idx="1">
+              <a:schemeClr val="accent1"/>
+            </a:fillRef>
+            <a:effectRef idx="0">
+              <a:schemeClr val="accent1"/>
+            </a:effectRef>
+            <a:fontRef idx="minor">
+              <a:schemeClr val="lt1"/>
+            </a:fontRef>
+          </p:style>
+          <p:txBody>
+            <a:bodyPr rtlCol="0" anchor="ctr"/>
+            <a:lstStyle/>
+            <a:p>
+              <a:pPr algn="ctr"/>
+              <a:endParaRPr lang="fr-FR"/>
+            </a:p>
+          </p:txBody>
+        </p:sp>
+        <p:sp>
+          <p:nvSpPr>
+            <p:cNvPr id="10" name="Rectangle 9"/>
+            <p:cNvSpPr/>
+            <p:nvPr/>
+          </p:nvSpPr>
+          <p:spPr>
+            <a:xfrm>
+              <a:off x="1771260" y="2642896"/>
+              <a:ext cx="2100944" cy="102636"/>
+            </a:xfrm>
+            <a:prstGeom prst="rect">
+              <a:avLst/>
+            </a:prstGeom>
+            <a:solidFill>
+              <a:srgbClr val="00B0F0"/>
+            </a:solidFill>
+            <a:ln>
+              <a:solidFill>
+                <a:srgbClr val="00B0F0"/>
+              </a:solidFill>
+            </a:ln>
+          </p:spPr>
+          <p:style>
+            <a:lnRef idx="2">
+              <a:schemeClr val="accent1">
+                <a:shade val="50000"/>
+              </a:schemeClr>
+            </a:lnRef>
+            <a:fillRef idx="1">
+              <a:schemeClr val="accent1"/>
+            </a:fillRef>
+            <a:effectRef idx="0">
+              <a:schemeClr val="accent1"/>
+            </a:effectRef>
+            <a:fontRef idx="minor">
+              <a:schemeClr val="lt1"/>
+            </a:fontRef>
+          </p:style>
+          <p:txBody>
+            <a:bodyPr rtlCol="0" anchor="ctr"/>
+            <a:lstStyle/>
+            <a:p>
+              <a:pPr algn="ctr"/>
+              <a:endParaRPr lang="fr-FR"/>
+            </a:p>
+          </p:txBody>
+        </p:sp>
+        <p:sp>
+          <p:nvSpPr>
+            <p:cNvPr id="11" name="Rectangle 10"/>
+            <p:cNvSpPr/>
+            <p:nvPr/>
+          </p:nvSpPr>
+          <p:spPr>
+            <a:xfrm>
+              <a:off x="1771260" y="2948471"/>
+              <a:ext cx="2100944" cy="102636"/>
+            </a:xfrm>
+            <a:prstGeom prst="rect">
+              <a:avLst/>
+            </a:prstGeom>
+            <a:solidFill>
+              <a:srgbClr val="00B0F0"/>
+            </a:solidFill>
+            <a:ln>
+              <a:solidFill>
+                <a:srgbClr val="00B0F0"/>
+              </a:solidFill>
+            </a:ln>
+          </p:spPr>
+          <p:style>
+            <a:lnRef idx="2">
+              <a:schemeClr val="accent1">
+                <a:shade val="50000"/>
+              </a:schemeClr>
+            </a:lnRef>
+            <a:fillRef idx="1">
+              <a:schemeClr val="accent1"/>
+            </a:fillRef>
+            <a:effectRef idx="0">
+              <a:schemeClr val="accent1"/>
+            </a:effectRef>
+            <a:fontRef idx="minor">
+              <a:schemeClr val="lt1"/>
+            </a:fontRef>
+          </p:style>
+          <p:txBody>
+            <a:bodyPr rtlCol="0" anchor="ctr"/>
+            <a:lstStyle/>
+            <a:p>
+              <a:pPr algn="ctr"/>
+              <a:endParaRPr lang="fr-FR"/>
+            </a:p>
+          </p:txBody>
+        </p:sp>
+      </p:grpSp>
+      <p:sp>
+        <p:nvSpPr>
+          <p:cNvPr id="7" name="ZoneTexte 6"/>
+          <p:cNvSpPr txBox="1"/>
+          <p:nvPr/>
+        </p:nvSpPr>
+        <p:spPr>
+          <a:xfrm>
+            <a:off x="6447789" y="2366714"/>
+            <a:ext cx="3647933" cy="3231654"/>
+          </a:xfrm>
+          <a:prstGeom prst="rect">
+            <a:avLst/>
+          </a:prstGeom>
+          <a:solidFill>
+            <a:schemeClr val="bg1">
+              <a:lumMod val="95000"/>
+            </a:schemeClr>
+          </a:solidFill>
+        </p:spPr>
+        <p:txBody>
+          <a:bodyPr wrap="square" rtlCol="0">
+            <a:spAutoFit/>
+          </a:bodyPr>
+          <a:lstStyle/>
+          <a:p>
+            <a:r>
+              <a:rPr lang="fr-FR" sz="1400" dirty="0">
+                <a:latin typeface="Courier New" panose="02070309020205020404" pitchFamily="49" charset="0"/>
+                <a:cs typeface="Courier New" panose="02070309020205020404" pitchFamily="49" charset="0"/>
+              </a:rPr>
+              <a:t>FROM &lt;image&gt;</a:t>
+            </a:r>
+          </a:p>
+          <a:p>
+            <a:r>
+              <a:rPr lang="fr-FR" sz="1400" dirty="0">
+                <a:latin typeface="Courier New" panose="02070309020205020404" pitchFamily="49" charset="0"/>
+                <a:cs typeface="Courier New" panose="02070309020205020404" pitchFamily="49" charset="0"/>
+              </a:rPr>
+              <a:t>MAINTAINER &lt;</a:t>
+            </a:r>
+            <a:r>
+              <a:rPr lang="fr-FR" sz="1400" dirty="0" err="1">
+                <a:latin typeface="Courier New" panose="02070309020205020404" pitchFamily="49" charset="0"/>
+                <a:cs typeface="Courier New" panose="02070309020205020404" pitchFamily="49" charset="0"/>
+              </a:rPr>
+              <a:t>author</a:t>
+            </a:r>
+            <a:r>
+              <a:rPr lang="fr-FR" sz="1400" dirty="0">
+                <a:latin typeface="Courier New" panose="02070309020205020404" pitchFamily="49" charset="0"/>
+                <a:cs typeface="Courier New" panose="02070309020205020404" pitchFamily="49" charset="0"/>
+              </a:rPr>
+              <a:t>&gt;</a:t>
+            </a:r>
+          </a:p>
+          <a:p>
+            <a:r>
+              <a:rPr lang="fr-FR" sz="1400" dirty="0">
+                <a:latin typeface="Courier New" panose="02070309020205020404" pitchFamily="49" charset="0"/>
+                <a:cs typeface="Courier New" panose="02070309020205020404" pitchFamily="49" charset="0"/>
+              </a:rPr>
+              <a:t>RUN &lt;command&gt;</a:t>
+            </a:r>
+          </a:p>
+          <a:p>
+            <a:r>
+              <a:rPr lang="fr-FR" sz="1400" dirty="0">
+                <a:latin typeface="Courier New" panose="02070309020205020404" pitchFamily="49" charset="0"/>
+                <a:cs typeface="Courier New" panose="02070309020205020404" pitchFamily="49" charset="0"/>
+              </a:rPr>
+              <a:t>WORKIR &lt;</a:t>
+            </a:r>
+            <a:r>
+              <a:rPr lang="fr-FR" sz="1400" dirty="0" err="1">
+                <a:latin typeface="Courier New" panose="02070309020205020404" pitchFamily="49" charset="0"/>
+                <a:cs typeface="Courier New" panose="02070309020205020404" pitchFamily="49" charset="0"/>
+              </a:rPr>
+              <a:t>path</a:t>
+            </a:r>
+            <a:r>
+              <a:rPr lang="fr-FR" sz="1400" dirty="0">
+                <a:latin typeface="Courier New" panose="02070309020205020404" pitchFamily="49" charset="0"/>
+                <a:cs typeface="Courier New" panose="02070309020205020404" pitchFamily="49" charset="0"/>
+              </a:rPr>
+              <a:t>&gt;</a:t>
+            </a:r>
+          </a:p>
+          <a:p>
+            <a:r>
+              <a:rPr lang="fr-FR" sz="1400" dirty="0">
+                <a:latin typeface="Courier New" panose="02070309020205020404" pitchFamily="49" charset="0"/>
+                <a:cs typeface="Courier New" panose="02070309020205020404" pitchFamily="49" charset="0"/>
+              </a:rPr>
+              <a:t>USER &lt;</a:t>
+            </a:r>
+            <a:r>
+              <a:rPr lang="fr-FR" sz="1400" dirty="0" err="1">
+                <a:latin typeface="Courier New" panose="02070309020205020404" pitchFamily="49" charset="0"/>
+                <a:cs typeface="Courier New" panose="02070309020205020404" pitchFamily="49" charset="0"/>
+              </a:rPr>
+              <a:t>name</a:t>
+            </a:r>
+            <a:r>
+              <a:rPr lang="fr-FR" sz="1400" dirty="0">
+                <a:latin typeface="Courier New" panose="02070309020205020404" pitchFamily="49" charset="0"/>
+                <a:cs typeface="Courier New" panose="02070309020205020404" pitchFamily="49" charset="0"/>
+              </a:rPr>
+              <a:t>&gt;</a:t>
+            </a:r>
+          </a:p>
+          <a:p>
+            <a:r>
+              <a:rPr lang="fr-FR" sz="1400" dirty="0">
+                <a:latin typeface="Courier New" panose="02070309020205020404" pitchFamily="49" charset="0"/>
+                <a:cs typeface="Courier New" panose="02070309020205020404" pitchFamily="49" charset="0"/>
+              </a:rPr>
+              <a:t>CMD &lt;command&gt;</a:t>
+            </a:r>
+          </a:p>
+          <a:p>
+            <a:r>
+              <a:rPr lang="fr-FR" sz="1400" dirty="0">
+                <a:latin typeface="Courier New" panose="02070309020205020404" pitchFamily="49" charset="0"/>
+                <a:cs typeface="Courier New" panose="02070309020205020404" pitchFamily="49" charset="0"/>
+              </a:rPr>
+              <a:t>EXPOSE &lt;port&gt;</a:t>
+            </a:r>
+          </a:p>
+          <a:p>
+            <a:r>
+              <a:rPr lang="fr-FR" sz="1400" dirty="0">
+                <a:latin typeface="Courier New" panose="02070309020205020404" pitchFamily="49" charset="0"/>
+                <a:cs typeface="Courier New" panose="02070309020205020404" pitchFamily="49" charset="0"/>
+              </a:rPr>
+              <a:t>VOLUME &lt;</a:t>
+            </a:r>
+            <a:r>
+              <a:rPr lang="fr-FR" sz="1400" dirty="0" err="1">
+                <a:latin typeface="Courier New" panose="02070309020205020404" pitchFamily="49" charset="0"/>
+                <a:cs typeface="Courier New" panose="02070309020205020404" pitchFamily="49" charset="0"/>
+              </a:rPr>
+              <a:t>folder</a:t>
+            </a:r>
+            <a:r>
+              <a:rPr lang="fr-FR" sz="1400" dirty="0">
+                <a:latin typeface="Courier New" panose="02070309020205020404" pitchFamily="49" charset="0"/>
+                <a:cs typeface="Courier New" panose="02070309020205020404" pitchFamily="49" charset="0"/>
+              </a:rPr>
+              <a:t>&gt;</a:t>
+            </a:r>
+          </a:p>
+          <a:p>
+            <a:r>
+              <a:rPr lang="fr-FR" sz="1400" dirty="0">
+                <a:latin typeface="Courier New" panose="02070309020205020404" pitchFamily="49" charset="0"/>
+                <a:cs typeface="Courier New" panose="02070309020205020404" pitchFamily="49" charset="0"/>
+              </a:rPr>
+              <a:t>ENV &lt;key&gt; &lt;value&gt;</a:t>
+            </a:r>
+          </a:p>
+          <a:p>
+            <a:r>
+              <a:rPr lang="fr-FR" sz="1400" dirty="0">
+                <a:latin typeface="Courier New" panose="02070309020205020404" pitchFamily="49" charset="0"/>
+                <a:cs typeface="Courier New" panose="02070309020205020404" pitchFamily="49" charset="0"/>
+              </a:rPr>
+              <a:t>COPY &lt;</a:t>
+            </a:r>
+            <a:r>
+              <a:rPr lang="fr-FR" sz="1400" dirty="0" err="1">
+                <a:latin typeface="Courier New" panose="02070309020205020404" pitchFamily="49" charset="0"/>
+                <a:cs typeface="Courier New" panose="02070309020205020404" pitchFamily="49" charset="0"/>
+              </a:rPr>
+              <a:t>src</a:t>
+            </a:r>
+            <a:r>
+              <a:rPr lang="fr-FR" sz="1400" dirty="0">
+                <a:latin typeface="Courier New" panose="02070309020205020404" pitchFamily="49" charset="0"/>
+                <a:cs typeface="Courier New" panose="02070309020205020404" pitchFamily="49" charset="0"/>
+              </a:rPr>
+              <a:t>&gt; &lt;</a:t>
+            </a:r>
+            <a:r>
+              <a:rPr lang="fr-FR" sz="1400" dirty="0" err="1">
+                <a:latin typeface="Courier New" panose="02070309020205020404" pitchFamily="49" charset="0"/>
+                <a:cs typeface="Courier New" panose="02070309020205020404" pitchFamily="49" charset="0"/>
+              </a:rPr>
+              <a:t>dest</a:t>
+            </a:r>
+            <a:r>
+              <a:rPr lang="fr-FR" sz="1400" dirty="0">
+                <a:latin typeface="Courier New" panose="02070309020205020404" pitchFamily="49" charset="0"/>
+                <a:cs typeface="Courier New" panose="02070309020205020404" pitchFamily="49" charset="0"/>
+              </a:rPr>
+              <a:t>&gt;</a:t>
+            </a:r>
+          </a:p>
+          <a:p>
+            <a:r>
+              <a:rPr lang="fr-FR" sz="1400" dirty="0">
+                <a:latin typeface="Courier New" panose="02070309020205020404" pitchFamily="49" charset="0"/>
+                <a:cs typeface="Courier New" panose="02070309020205020404" pitchFamily="49" charset="0"/>
+              </a:rPr>
+              <a:t>ADD &lt;</a:t>
+            </a:r>
+            <a:r>
+              <a:rPr lang="fr-FR" sz="1400" dirty="0" err="1">
+                <a:latin typeface="Courier New" panose="02070309020205020404" pitchFamily="49" charset="0"/>
+                <a:cs typeface="Courier New" panose="02070309020205020404" pitchFamily="49" charset="0"/>
+              </a:rPr>
+              <a:t>src</a:t>
+            </a:r>
+            <a:r>
+              <a:rPr lang="fr-FR" sz="1400" dirty="0">
+                <a:latin typeface="Courier New" panose="02070309020205020404" pitchFamily="49" charset="0"/>
+                <a:cs typeface="Courier New" panose="02070309020205020404" pitchFamily="49" charset="0"/>
+              </a:rPr>
+              <a:t>&gt; &lt;</a:t>
+            </a:r>
+            <a:r>
+              <a:rPr lang="fr-FR" sz="1400" dirty="0" err="1">
+                <a:latin typeface="Courier New" panose="02070309020205020404" pitchFamily="49" charset="0"/>
+                <a:cs typeface="Courier New" panose="02070309020205020404" pitchFamily="49" charset="0"/>
+              </a:rPr>
+              <a:t>dest</a:t>
+            </a:r>
+            <a:r>
+              <a:rPr lang="fr-FR" sz="1400" dirty="0">
+                <a:latin typeface="Courier New" panose="02070309020205020404" pitchFamily="49" charset="0"/>
+                <a:cs typeface="Courier New" panose="02070309020205020404" pitchFamily="49" charset="0"/>
+              </a:rPr>
+              <a:t>&gt;</a:t>
+            </a:r>
+          </a:p>
+          <a:p>
+            <a:endParaRPr lang="fr-FR" sz="1400" dirty="0">
+              <a:latin typeface="Courier New" panose="02070309020205020404" pitchFamily="49" charset="0"/>
+              <a:cs typeface="Courier New" panose="02070309020205020404" pitchFamily="49" charset="0"/>
+            </a:endParaRPr>
+          </a:p>
+          <a:p>
+            <a:r>
+              <a:rPr lang="fr-FR" dirty="0"/>
+              <a:t>…</a:t>
+            </a:r>
+          </a:p>
+          <a:p>
+            <a:endParaRPr lang="fr-FR" dirty="0"/>
+          </a:p>
+        </p:txBody>
+      </p:sp>
+      <p:sp>
+        <p:nvSpPr>
+          <p:cNvPr id="13" name="ZoneTexte 12"/>
+          <p:cNvSpPr txBox="1"/>
+          <p:nvPr/>
+        </p:nvSpPr>
+        <p:spPr>
+          <a:xfrm>
+            <a:off x="755780" y="494522"/>
+            <a:ext cx="1131015" cy="369332"/>
+          </a:xfrm>
+          <a:prstGeom prst="rect">
+            <a:avLst/>
+          </a:prstGeom>
+          <a:noFill/>
+        </p:spPr>
+        <p:txBody>
+          <a:bodyPr wrap="none" rtlCol="0">
+            <a:spAutoFit/>
+          </a:bodyPr>
+          <a:lstStyle/>
+          <a:p>
+            <a:r>
+              <a:rPr lang="fr-FR" dirty="0" err="1"/>
+              <a:t>Dockerfile</a:t>
+            </a:r>
+            <a:endParaRPr lang="fr-FR" dirty="0"/>
+          </a:p>
+        </p:txBody>
+      </p:sp>
+      <p:sp>
+        <p:nvSpPr>
+          <p:cNvPr id="2" name="ZoneTexte 1"/>
+          <p:cNvSpPr txBox="1"/>
+          <p:nvPr/>
+        </p:nvSpPr>
+        <p:spPr>
+          <a:xfrm>
+            <a:off x="5654351" y="1716833"/>
+            <a:ext cx="4966616" cy="369332"/>
+          </a:xfrm>
+          <a:prstGeom prst="rect">
+            <a:avLst/>
+          </a:prstGeom>
+          <a:noFill/>
+        </p:spPr>
+        <p:txBody>
+          <a:bodyPr wrap="none" rtlCol="0">
+            <a:spAutoFit/>
+          </a:bodyPr>
+          <a:lstStyle/>
+          <a:p>
+            <a:r>
+              <a:rPr lang="fr-FR" dirty="0"/>
+              <a:t>Utilise le principe de « directives », ou instructions,</a:t>
+            </a:r>
+          </a:p>
+        </p:txBody>
+      </p:sp>
+    </p:spTree>
+    <p:extLst>
+      <p:ext uri="{BB962C8B-B14F-4D97-AF65-F5344CB8AC3E}">
+        <p14:creationId xmlns:p14="http://schemas.microsoft.com/office/powerpoint/2010/main" val="4247830320"/>
+      </p:ext>
+    </p:extLst>
+  </p:cSld>
+  <p:clrMapOvr>
+    <a:masterClrMapping/>
+  </p:clrMapOvr>
+</p:sld>
+</file>
+
+<file path=ppt/slides/slide5.xml><?xml version="1.0" encoding="utf-8"?>
 <p:sld xmlns:a="http://schemas.openxmlformats.org/drawingml/2006/main" xmlns:r="http://schemas.openxmlformats.org/officeDocument/2006/relationships" xmlns:p="http://schemas.openxmlformats.org/presentationml/2006/main">
   <p:cSld>
     <p:spTree>
@@ -4139,7 +5950,7 @@
         </p:blipFill>
         <p:spPr bwMode="auto">
           <a:xfrm>
-            <a:off x="7315201" y="2514042"/>
+            <a:off x="8136295" y="2617308"/>
             <a:ext cx="3547382" cy="2019921"/>
           </a:xfrm>
           <a:prstGeom prst="rect">
@@ -4194,9 +6005,9 @@
           <p:nvPr/>
         </p:nvCxnSpPr>
         <p:spPr>
-          <a:xfrm>
-            <a:off x="5701004" y="3685592"/>
-            <a:ext cx="1026367" cy="0"/>
+          <a:xfrm flipV="1">
+            <a:off x="5701004" y="3684270"/>
+            <a:ext cx="1816126" cy="1322"/>
           </a:xfrm>
           <a:prstGeom prst="straightConnector1">
             <a:avLst/>
@@ -4223,6 +6034,50 @@
           </a:fontRef>
         </p:style>
       </p:cxnSp>
+      <p:sp>
+        <p:nvSpPr>
+          <p:cNvPr id="16" name="ZoneTexte 15"/>
+          <p:cNvSpPr txBox="1"/>
+          <p:nvPr/>
+        </p:nvSpPr>
+        <p:spPr>
+          <a:xfrm>
+            <a:off x="5537843" y="2821586"/>
+            <a:ext cx="2142448" cy="369332"/>
+          </a:xfrm>
+          <a:prstGeom prst="rect">
+            <a:avLst/>
+          </a:prstGeom>
+          <a:solidFill>
+            <a:schemeClr val="bg1">
+              <a:lumMod val="95000"/>
+            </a:schemeClr>
+          </a:solidFill>
+        </p:spPr>
+        <p:txBody>
+          <a:bodyPr wrap="square" rtlCol="0">
+            <a:spAutoFit/>
+          </a:bodyPr>
+          <a:lstStyle/>
+          <a:p>
+            <a:r>
+              <a:rPr lang="fr-FR" dirty="0">
+                <a:latin typeface="Courier New" panose="02070309020205020404" pitchFamily="49" charset="0"/>
+                <a:cs typeface="Courier New" panose="02070309020205020404" pitchFamily="49" charset="0"/>
+              </a:rPr>
+              <a:t>$ docker </a:t>
+            </a:r>
+            <a:r>
+              <a:rPr lang="fr-FR" dirty="0" err="1">
+                <a:latin typeface="Courier New" panose="02070309020205020404" pitchFamily="49" charset="0"/>
+                <a:cs typeface="Courier New" panose="02070309020205020404" pitchFamily="49" charset="0"/>
+              </a:rPr>
+              <a:t>build</a:t>
+            </a:r>
+            <a:endParaRPr lang="fr-FR" sz="2400" dirty="0"/>
+          </a:p>
+        </p:txBody>
+      </p:sp>
     </p:spTree>
     <p:extLst>
       <p:ext uri="{BB962C8B-B14F-4D97-AF65-F5344CB8AC3E}">
@@ -4236,7 +6091,192 @@
 </p:sld>
 </file>
 
-<file path=ppt/slides/slide3.xml><?xml version="1.0" encoding="utf-8"?>
+<file path=ppt/slides/slide6.xml><?xml version="1.0" encoding="utf-8"?>
+<p:sld xmlns:a="http://schemas.openxmlformats.org/drawingml/2006/main" xmlns:r="http://schemas.openxmlformats.org/officeDocument/2006/relationships" xmlns:p="http://schemas.openxmlformats.org/presentationml/2006/main">
+  <p:cSld>
+    <p:spTree>
+      <p:nvGrpSpPr>
+        <p:cNvPr id="1" name=""/>
+        <p:cNvGrpSpPr/>
+        <p:nvPr/>
+      </p:nvGrpSpPr>
+      <p:grpSpPr>
+        <a:xfrm>
+          <a:off x="0" y="0"/>
+          <a:ext cx="0" cy="0"/>
+          <a:chOff x="0" y="0"/>
+          <a:chExt cx="0" cy="0"/>
+        </a:xfrm>
+      </p:grpSpPr>
+      <p:sp>
+        <p:nvSpPr>
+          <p:cNvPr id="12" name="ZoneTexte 11"/>
+          <p:cNvSpPr txBox="1"/>
+          <p:nvPr/>
+        </p:nvSpPr>
+        <p:spPr>
+          <a:xfrm>
+            <a:off x="755780" y="494522"/>
+            <a:ext cx="1280094" cy="369332"/>
+          </a:xfrm>
+          <a:prstGeom prst="rect">
+            <a:avLst/>
+          </a:prstGeom>
+          <a:noFill/>
+        </p:spPr>
+        <p:txBody>
+          <a:bodyPr wrap="none" rtlCol="0">
+            <a:spAutoFit/>
+          </a:bodyPr>
+          <a:lstStyle/>
+          <a:p>
+            <a:r>
+              <a:rPr lang="fr-FR" dirty="0"/>
+              <a:t>Docker Hub</a:t>
+            </a:r>
+          </a:p>
+        </p:txBody>
+      </p:sp>
+      <p:pic>
+        <p:nvPicPr>
+          <p:cNvPr id="3082" name="Picture 10" descr="https://raw.githubusercontent.com/docker-library/docs/471fa6e4cb58062ccbf91afc111980f9c7004981/swarm/logo.png"/>
+          <p:cNvPicPr>
+            <a:picLocks noChangeAspect="1" noChangeArrowheads="1"/>
+          </p:cNvPicPr>
+          <p:nvPr/>
+        </p:nvPicPr>
+        <p:blipFill>
+          <a:blip r:embed="rId2">
+            <a:extLst>
+              <a:ext uri="{28A0092B-C50C-407E-A947-70E740481C1C}">
+                <a14:useLocalDpi xmlns:a14="http://schemas.microsoft.com/office/drawing/2010/main" val="0"/>
+              </a:ext>
+            </a:extLst>
+          </a:blip>
+          <a:srcRect/>
+          <a:stretch>
+            <a:fillRect/>
+          </a:stretch>
+        </p:blipFill>
+        <p:spPr bwMode="auto">
+          <a:xfrm>
+            <a:off x="821094" y="1773399"/>
+            <a:ext cx="4876800" cy="4057650"/>
+          </a:xfrm>
+          <a:prstGeom prst="rect">
+            <a:avLst/>
+          </a:prstGeom>
+          <a:noFill/>
+          <a:extLst>
+            <a:ext uri="{909E8E84-426E-40DD-AFC4-6F175D3DCCD1}">
+              <a14:hiddenFill xmlns:a14="http://schemas.microsoft.com/office/drawing/2010/main">
+                <a:solidFill>
+                  <a:srgbClr val="FFFFFF"/>
+                </a:solidFill>
+              </a14:hiddenFill>
+            </a:ext>
+          </a:extLst>
+        </p:spPr>
+      </p:pic>
+      <p:sp>
+        <p:nvSpPr>
+          <p:cNvPr id="6" name="ZoneTexte 5"/>
+          <p:cNvSpPr txBox="1"/>
+          <p:nvPr/>
+        </p:nvSpPr>
+        <p:spPr>
+          <a:xfrm>
+            <a:off x="6120881" y="2435291"/>
+            <a:ext cx="5467739" cy="3693319"/>
+          </a:xfrm>
+          <a:prstGeom prst="rect">
+            <a:avLst/>
+          </a:prstGeom>
+          <a:noFill/>
+        </p:spPr>
+        <p:txBody>
+          <a:bodyPr wrap="square" rtlCol="0">
+            <a:spAutoFit/>
+          </a:bodyPr>
+          <a:lstStyle/>
+          <a:p>
+            <a:r>
+              <a:rPr lang="fr-FR" dirty="0"/>
+              <a:t>Serveur centralisé officiel</a:t>
+            </a:r>
+          </a:p>
+          <a:p>
+            <a:endParaRPr lang="fr-FR" dirty="0"/>
+          </a:p>
+          <a:p>
+            <a:r>
+              <a:rPr lang="fr-FR" dirty="0"/>
+              <a:t>$ docker </a:t>
+            </a:r>
+            <a:r>
+              <a:rPr lang="fr-FR" dirty="0" err="1"/>
+              <a:t>search</a:t>
+            </a:r>
+            <a:r>
+              <a:rPr lang="fr-FR" dirty="0"/>
+              <a:t>, pull, login, push</a:t>
+            </a:r>
+          </a:p>
+          <a:p>
+            <a:endParaRPr lang="fr-FR" dirty="0"/>
+          </a:p>
+          <a:p>
+            <a:r>
+              <a:rPr lang="fr-FR" dirty="0"/>
+              <a:t>100.000+ images</a:t>
+            </a:r>
+          </a:p>
+          <a:p>
+            <a:endParaRPr lang="fr-FR" dirty="0"/>
+          </a:p>
+          <a:p>
+            <a:r>
+              <a:rPr lang="fr-FR" dirty="0"/>
+              <a:t>Images « officielles » ou proposées par la communauté</a:t>
+            </a:r>
+          </a:p>
+          <a:p>
+            <a:endParaRPr lang="fr-FR" dirty="0"/>
+          </a:p>
+          <a:p>
+            <a:r>
+              <a:rPr lang="fr-FR" dirty="0"/>
+              <a:t>Gratuit pour les projets open-source</a:t>
+            </a:r>
+          </a:p>
+          <a:p>
+            <a:endParaRPr lang="fr-FR" dirty="0"/>
+          </a:p>
+          <a:p>
+            <a:endParaRPr lang="fr-FR" dirty="0"/>
+          </a:p>
+          <a:p>
+            <a:endParaRPr lang="fr-FR" dirty="0"/>
+          </a:p>
+          <a:p>
+            <a:endParaRPr lang="fr-FR" dirty="0"/>
+          </a:p>
+        </p:txBody>
+      </p:sp>
+    </p:spTree>
+    <p:extLst>
+      <p:ext uri="{BB962C8B-B14F-4D97-AF65-F5344CB8AC3E}">
+        <p14:creationId xmlns:p14="http://schemas.microsoft.com/office/powerpoint/2010/main" val="4118430532"/>
+      </p:ext>
+    </p:extLst>
+  </p:cSld>
+  <p:clrMapOvr>
+    <a:masterClrMapping/>
+  </p:clrMapOvr>
+</p:sld>
+</file>
+
+<file path=ppt/slides/slide7.xml><?xml version="1.0" encoding="utf-8"?>
 <p:sld xmlns:a="http://schemas.openxmlformats.org/drawingml/2006/main" xmlns:r="http://schemas.openxmlformats.org/officeDocument/2006/relationships" xmlns:p="http://schemas.openxmlformats.org/presentationml/2006/main">
   <p:cSld>
     <p:spTree>
@@ -4305,7 +6345,7 @@
         </p:blipFill>
         <p:spPr bwMode="auto">
           <a:xfrm>
-            <a:off x="6386804" y="1387056"/>
+            <a:off x="6386804" y="1592329"/>
             <a:ext cx="4297232" cy="1592841"/>
           </a:xfrm>
           <a:prstGeom prst="rect">
@@ -4408,7 +6448,248 @@
     </p:spTree>
     <p:extLst>
       <p:ext uri="{BB962C8B-B14F-4D97-AF65-F5344CB8AC3E}">
-        <p14:creationId xmlns:p14="http://schemas.microsoft.com/office/powerpoint/2010/main" val="4118430532"/>
+        <p14:creationId xmlns:p14="http://schemas.microsoft.com/office/powerpoint/2010/main" val="1182227716"/>
+      </p:ext>
+    </p:extLst>
+  </p:cSld>
+  <p:clrMapOvr>
+    <a:masterClrMapping/>
+  </p:clrMapOvr>
+</p:sld>
+</file>
+
+<file path=ppt/slides/slide8.xml><?xml version="1.0" encoding="utf-8"?>
+<p:sld xmlns:a="http://schemas.openxmlformats.org/drawingml/2006/main" xmlns:r="http://schemas.openxmlformats.org/officeDocument/2006/relationships" xmlns:p="http://schemas.openxmlformats.org/presentationml/2006/main">
+  <p:cSld>
+    <p:spTree>
+      <p:nvGrpSpPr>
+        <p:cNvPr id="1" name=""/>
+        <p:cNvGrpSpPr/>
+        <p:nvPr/>
+      </p:nvGrpSpPr>
+      <p:grpSpPr>
+        <a:xfrm>
+          <a:off x="0" y="0"/>
+          <a:ext cx="0" cy="0"/>
+          <a:chOff x="0" y="0"/>
+          <a:chExt cx="0" cy="0"/>
+        </a:xfrm>
+      </p:grpSpPr>
+      <p:pic>
+        <p:nvPicPr>
+          <p:cNvPr id="4098" name="Picture 2" descr="https://www.docker.com/sites/default/files/docker_toolbox.png"/>
+          <p:cNvPicPr>
+            <a:picLocks noChangeAspect="1" noChangeArrowheads="1"/>
+          </p:cNvPicPr>
+          <p:nvPr/>
+        </p:nvPicPr>
+        <p:blipFill>
+          <a:blip r:embed="rId2">
+            <a:extLst>
+              <a:ext uri="{28A0092B-C50C-407E-A947-70E740481C1C}">
+                <a14:useLocalDpi xmlns:a14="http://schemas.microsoft.com/office/drawing/2010/main" val="0"/>
+              </a:ext>
+            </a:extLst>
+          </a:blip>
+          <a:srcRect/>
+          <a:stretch>
+            <a:fillRect/>
+          </a:stretch>
+        </p:blipFill>
+        <p:spPr bwMode="auto">
+          <a:xfrm>
+            <a:off x="338533" y="-105247"/>
+            <a:ext cx="6259286" cy="6259286"/>
+          </a:xfrm>
+          <a:prstGeom prst="rect">
+            <a:avLst/>
+          </a:prstGeom>
+          <a:noFill/>
+          <a:extLst>
+            <a:ext uri="{909E8E84-426E-40DD-AFC4-6F175D3DCCD1}">
+              <a14:hiddenFill xmlns:a14="http://schemas.microsoft.com/office/drawing/2010/main">
+                <a:solidFill>
+                  <a:srgbClr val="FFFFFF"/>
+                </a:solidFill>
+              </a14:hiddenFill>
+            </a:ext>
+          </a:extLst>
+        </p:spPr>
+      </p:pic>
+      <p:sp>
+        <p:nvSpPr>
+          <p:cNvPr id="12" name="ZoneTexte 11"/>
+          <p:cNvSpPr txBox="1"/>
+          <p:nvPr/>
+        </p:nvSpPr>
+        <p:spPr>
+          <a:xfrm>
+            <a:off x="755780" y="494522"/>
+            <a:ext cx="1280094" cy="369332"/>
+          </a:xfrm>
+          <a:prstGeom prst="rect">
+            <a:avLst/>
+          </a:prstGeom>
+          <a:noFill/>
+        </p:spPr>
+        <p:txBody>
+          <a:bodyPr wrap="none" rtlCol="0">
+            <a:spAutoFit/>
+          </a:bodyPr>
+          <a:lstStyle/>
+          <a:p>
+            <a:r>
+              <a:rPr lang="fr-FR" dirty="0"/>
+              <a:t>Docker Hub</a:t>
+            </a:r>
+          </a:p>
+        </p:txBody>
+      </p:sp>
+      <p:sp>
+        <p:nvSpPr>
+          <p:cNvPr id="7" name="ZoneTexte 6"/>
+          <p:cNvSpPr txBox="1"/>
+          <p:nvPr/>
+        </p:nvSpPr>
+        <p:spPr>
+          <a:xfrm>
+            <a:off x="6305519" y="2927660"/>
+            <a:ext cx="5467739" cy="1200329"/>
+          </a:xfrm>
+          <a:prstGeom prst="rect">
+            <a:avLst/>
+          </a:prstGeom>
+          <a:noFill/>
+        </p:spPr>
+        <p:txBody>
+          <a:bodyPr wrap="square" rtlCol="0">
+            <a:spAutoFit/>
+          </a:bodyPr>
+          <a:lstStyle/>
+          <a:p>
+            <a:r>
+              <a:rPr lang="fr-FR" dirty="0"/>
+              <a:t>Possibilité de créer son propre registre d’images</a:t>
+            </a:r>
+          </a:p>
+          <a:p>
+            <a:endParaRPr lang="fr-FR" dirty="0"/>
+          </a:p>
+          <a:p>
+            <a:endParaRPr lang="fr-FR" dirty="0"/>
+          </a:p>
+          <a:p>
+            <a:endParaRPr lang="fr-FR" dirty="0"/>
+          </a:p>
+        </p:txBody>
+      </p:sp>
+      <p:sp>
+        <p:nvSpPr>
+          <p:cNvPr id="8" name="ZoneTexte 7"/>
+          <p:cNvSpPr txBox="1"/>
+          <p:nvPr/>
+        </p:nvSpPr>
+        <p:spPr>
+          <a:xfrm>
+            <a:off x="1239716" y="5684649"/>
+            <a:ext cx="9908930" cy="369332"/>
+          </a:xfrm>
+          <a:prstGeom prst="rect">
+            <a:avLst/>
+          </a:prstGeom>
+          <a:solidFill>
+            <a:schemeClr val="bg1">
+              <a:lumMod val="95000"/>
+            </a:schemeClr>
+          </a:solidFill>
+        </p:spPr>
+        <p:txBody>
+          <a:bodyPr wrap="square" rtlCol="0">
+            <a:spAutoFit/>
+          </a:bodyPr>
+          <a:lstStyle/>
+          <a:p>
+            <a:r>
+              <a:rPr lang="fr-FR" altLang="fr-FR" dirty="0">
+                <a:latin typeface="Courier New" panose="02070309020205020404" pitchFamily="49" charset="0"/>
+                <a:cs typeface="Courier New" panose="02070309020205020404" pitchFamily="49" charset="0"/>
+              </a:rPr>
+              <a:t>docker </a:t>
+            </a:r>
+            <a:r>
+              <a:rPr lang="fr-FR" altLang="fr-FR" dirty="0" err="1">
+                <a:latin typeface="Courier New" panose="02070309020205020404" pitchFamily="49" charset="0"/>
+                <a:cs typeface="Courier New" panose="02070309020205020404" pitchFamily="49" charset="0"/>
+              </a:rPr>
+              <a:t>run</a:t>
+            </a:r>
+            <a:r>
+              <a:rPr lang="fr-FR" altLang="fr-FR" dirty="0">
+                <a:latin typeface="Courier New" panose="02070309020205020404" pitchFamily="49" charset="0"/>
+                <a:cs typeface="Courier New" panose="02070309020205020404" pitchFamily="49" charset="0"/>
+              </a:rPr>
+              <a:t> -d -p 5000:5000 --restart=</a:t>
+            </a:r>
+            <a:r>
+              <a:rPr lang="fr-FR" altLang="fr-FR" dirty="0" err="1">
+                <a:latin typeface="Courier New" panose="02070309020205020404" pitchFamily="49" charset="0"/>
+                <a:cs typeface="Courier New" panose="02070309020205020404" pitchFamily="49" charset="0"/>
+              </a:rPr>
+              <a:t>always</a:t>
+            </a:r>
+            <a:r>
+              <a:rPr lang="fr-FR" altLang="fr-FR" dirty="0">
+                <a:latin typeface="Courier New" panose="02070309020205020404" pitchFamily="49" charset="0"/>
+                <a:cs typeface="Courier New" panose="02070309020205020404" pitchFamily="49" charset="0"/>
+              </a:rPr>
+              <a:t> --</a:t>
+            </a:r>
+            <a:r>
+              <a:rPr lang="fr-FR" altLang="fr-FR" dirty="0" err="1">
+                <a:latin typeface="Courier New" panose="02070309020205020404" pitchFamily="49" charset="0"/>
+                <a:cs typeface="Courier New" panose="02070309020205020404" pitchFamily="49" charset="0"/>
+              </a:rPr>
+              <a:t>name</a:t>
+            </a:r>
+            <a:r>
+              <a:rPr lang="fr-FR" altLang="fr-FR" dirty="0">
+                <a:latin typeface="Courier New" panose="02070309020205020404" pitchFamily="49" charset="0"/>
+                <a:cs typeface="Courier New" panose="02070309020205020404" pitchFamily="49" charset="0"/>
+              </a:rPr>
+              <a:t> </a:t>
+            </a:r>
+            <a:r>
+              <a:rPr lang="fr-FR" altLang="fr-FR" dirty="0" err="1">
+                <a:latin typeface="Courier New" panose="02070309020205020404" pitchFamily="49" charset="0"/>
+                <a:cs typeface="Courier New" panose="02070309020205020404" pitchFamily="49" charset="0"/>
+              </a:rPr>
+              <a:t>registry</a:t>
+            </a:r>
+            <a:r>
+              <a:rPr lang="fr-FR" altLang="fr-FR" dirty="0">
+                <a:latin typeface="Courier New" panose="02070309020205020404" pitchFamily="49" charset="0"/>
+                <a:cs typeface="Courier New" panose="02070309020205020404" pitchFamily="49" charset="0"/>
+              </a:rPr>
+              <a:t> registry:2</a:t>
+            </a:r>
+            <a:r>
+              <a:rPr lang="fr-FR" altLang="fr-FR" sz="1400" dirty="0">
+                <a:latin typeface="Courier New" panose="02070309020205020404" pitchFamily="49" charset="0"/>
+                <a:cs typeface="Courier New" panose="02070309020205020404" pitchFamily="49" charset="0"/>
+              </a:rPr>
+              <a:t> </a:t>
+            </a:r>
+            <a:endParaRPr lang="fr-FR" altLang="fr-FR" sz="4000" dirty="0">
+              <a:latin typeface="Courier New" panose="02070309020205020404" pitchFamily="49" charset="0"/>
+              <a:cs typeface="Courier New" panose="02070309020205020404" pitchFamily="49" charset="0"/>
+            </a:endParaRPr>
+          </a:p>
+        </p:txBody>
+      </p:sp>
+    </p:spTree>
+    <p:extLst>
+      <p:ext uri="{BB962C8B-B14F-4D97-AF65-F5344CB8AC3E}">
+        <p14:creationId xmlns:p14="http://schemas.microsoft.com/office/powerpoint/2010/main" val="107994518"/>
       </p:ext>
     </p:extLst>
   </p:cSld>

</xml_diff>